<commit_message>
Added slide on accessing JASMIN / MobaXTerm
</commit_message>
<xml_diff>
--- a/overview_presentations/Parallel_Processing_Large_Data.pptx
+++ b/overview_presentations/Parallel_Processing_Large_Data.pptx
@@ -5,7 +5,7 @@
     <p:sldMasterId id="2147483666" r:id="rId1"/>
   </p:sldMasterIdLst>
   <p:notesMasterIdLst>
-    <p:notesMasterId r:id="rId34"/>
+    <p:notesMasterId r:id="rId35"/>
   </p:notesMasterIdLst>
   <p:sldIdLst>
     <p:sldId id="256" r:id="rId2"/>
@@ -21,62 +21,63 @@
     <p:sldId id="266" r:id="rId12"/>
     <p:sldId id="267" r:id="rId13"/>
     <p:sldId id="268" r:id="rId14"/>
-    <p:sldId id="269" r:id="rId15"/>
-    <p:sldId id="270" r:id="rId16"/>
-    <p:sldId id="271" r:id="rId17"/>
-    <p:sldId id="273" r:id="rId18"/>
-    <p:sldId id="274" r:id="rId19"/>
-    <p:sldId id="276" r:id="rId20"/>
-    <p:sldId id="277" r:id="rId21"/>
-    <p:sldId id="272" r:id="rId22"/>
-    <p:sldId id="278" r:id="rId23"/>
-    <p:sldId id="279" r:id="rId24"/>
-    <p:sldId id="280" r:id="rId25"/>
-    <p:sldId id="281" r:id="rId26"/>
-    <p:sldId id="275" r:id="rId27"/>
-    <p:sldId id="282" r:id="rId28"/>
-    <p:sldId id="283" r:id="rId29"/>
-    <p:sldId id="285" r:id="rId30"/>
-    <p:sldId id="286" r:id="rId31"/>
-    <p:sldId id="287" r:id="rId32"/>
-    <p:sldId id="288" r:id="rId33"/>
+    <p:sldId id="290" r:id="rId15"/>
+    <p:sldId id="269" r:id="rId16"/>
+    <p:sldId id="270" r:id="rId17"/>
+    <p:sldId id="271" r:id="rId18"/>
+    <p:sldId id="273" r:id="rId19"/>
+    <p:sldId id="274" r:id="rId20"/>
+    <p:sldId id="276" r:id="rId21"/>
+    <p:sldId id="277" r:id="rId22"/>
+    <p:sldId id="272" r:id="rId23"/>
+    <p:sldId id="278" r:id="rId24"/>
+    <p:sldId id="279" r:id="rId25"/>
+    <p:sldId id="280" r:id="rId26"/>
+    <p:sldId id="281" r:id="rId27"/>
+    <p:sldId id="275" r:id="rId28"/>
+    <p:sldId id="282" r:id="rId29"/>
+    <p:sldId id="283" r:id="rId30"/>
+    <p:sldId id="285" r:id="rId31"/>
+    <p:sldId id="286" r:id="rId32"/>
+    <p:sldId id="287" r:id="rId33"/>
+    <p:sldId id="288" r:id="rId34"/>
   </p:sldIdLst>
   <p:sldSz cx="9144000" cy="6858000" type="screen4x3"/>
   <p:notesSz cx="6858000" cy="9144000"/>
   <p:embeddedFontLst>
     <p:embeddedFont>
+      <p:font typeface="Calibri" panose="020F0502020204030204" pitchFamily="34" charset="0"/>
+      <p:regular r:id="rId36"/>
+      <p:bold r:id="rId37"/>
+      <p:italic r:id="rId38"/>
+      <p:boldItalic r:id="rId39"/>
+    </p:embeddedFont>
+    <p:embeddedFont>
+      <p:font typeface="Merriweather Sans" panose="020B0604020202020204" charset="0"/>
+      <p:regular r:id="rId40"/>
+      <p:bold r:id="rId41"/>
+      <p:italic r:id="rId42"/>
+      <p:boldItalic r:id="rId43"/>
+    </p:embeddedFont>
+    <p:embeddedFont>
+      <p:font typeface="ＭＳ Ｐゴシック" panose="020B0600070205080204" pitchFamily="34" charset="-128"/>
+      <p:regular r:id="rId44"/>
+    </p:embeddedFont>
+    <p:embeddedFont>
       <p:font typeface="Nunito" panose="020B0604020202020204" charset="0"/>
-      <p:bold r:id="rId35"/>
-      <p:boldItalic r:id="rId36"/>
+      <p:bold r:id="rId45"/>
+      <p:boldItalic r:id="rId46"/>
     </p:embeddedFont>
     <p:embeddedFont>
       <p:font typeface="Arimo" panose="020B0604020202020204" charset="0"/>
-      <p:regular r:id="rId37"/>
-      <p:bold r:id="rId38"/>
-      <p:italic r:id="rId39"/>
-      <p:boldItalic r:id="rId40"/>
-    </p:embeddedFont>
-    <p:embeddedFont>
-      <p:font typeface="Merriweather Sans" panose="020B0604020202020204" charset="0"/>
-      <p:regular r:id="rId41"/>
-      <p:bold r:id="rId42"/>
-      <p:italic r:id="rId43"/>
-      <p:boldItalic r:id="rId44"/>
+      <p:regular r:id="rId47"/>
+      <p:bold r:id="rId48"/>
+      <p:italic r:id="rId49"/>
+      <p:boldItalic r:id="rId50"/>
     </p:embeddedFont>
     <p:embeddedFont>
       <p:font typeface="Arial Rounded MT Bold" panose="020F0704030504030204" pitchFamily="34" charset="0"/>
-      <p:regular r:id="rId45"/>
-    </p:embeddedFont>
-    <p:embeddedFont>
-      <p:font typeface="Calibri" panose="020F0502020204030204" pitchFamily="34" charset="0"/>
-      <p:regular r:id="rId46"/>
-      <p:bold r:id="rId47"/>
-      <p:italic r:id="rId48"/>
-      <p:boldItalic r:id="rId49"/>
-    </p:embeddedFont>
-    <p:embeddedFont>
-      <p:font typeface="ＭＳ Ｐゴシック" panose="020B0600070205080204" pitchFamily="34" charset="-128"/>
-      <p:regular r:id="rId50"/>
+      <p:regular r:id="rId51"/>
     </p:embeddedFont>
   </p:embeddedFontLst>
   <p:defaultTextStyle>
@@ -2273,7 +2274,7 @@
             </a:pPr>
             <a:fld id="{00000000-1234-1234-1234-123412341234}" type="slidenum">
               <a:rPr lang="en-GB"/>
-              <a:t>17</a:t>
+              <a:t>18</a:t>
             </a:fld>
             <a:endParaRPr/>
           </a:p>
@@ -2823,7 +2824,7 @@
                 <a:cs typeface="Arial"/>
                 <a:sym typeface="Arial"/>
               </a:rPr>
-              <a:t>19</a:t>
+              <a:t>20</a:t>
             </a:fld>
             <a:endParaRPr sz="1200">
               <a:solidFill>
@@ -3742,7 +3743,7 @@
                 <a:cs typeface="Arial"/>
                 <a:sym typeface="Arial"/>
               </a:rPr>
-              <a:t>22</a:t>
+              <a:t>23</a:t>
             </a:fld>
             <a:endParaRPr sz="1200">
               <a:solidFill>
@@ -3986,7 +3987,7 @@
                 <a:cs typeface="Arial"/>
                 <a:sym typeface="Arial"/>
               </a:rPr>
-              <a:t>23</a:t>
+              <a:t>24</a:t>
             </a:fld>
             <a:endParaRPr sz="1200">
               <a:solidFill>
@@ -4289,7 +4290,7 @@
                 <a:cs typeface="Arial"/>
                 <a:sym typeface="Arial"/>
               </a:rPr>
-              <a:t>24</a:t>
+              <a:t>25</a:t>
             </a:fld>
             <a:endParaRPr sz="1200">
               <a:solidFill>
@@ -4592,7 +4593,7 @@
                 <a:cs typeface="Arial"/>
                 <a:sym typeface="Arial"/>
               </a:rPr>
-              <a:t>25</a:t>
+              <a:t>26</a:t>
             </a:fld>
             <a:endParaRPr sz="1200">
               <a:solidFill>
@@ -5132,7 +5133,7 @@
                 <a:cs typeface="Arial"/>
                 <a:sym typeface="Arial"/>
               </a:rPr>
-              <a:t>27</a:t>
+              <a:t>28</a:t>
             </a:fld>
             <a:endParaRPr sz="1200">
               <a:solidFill>
@@ -5435,7 +5436,7 @@
                 <a:cs typeface="Arial"/>
                 <a:sym typeface="Arial"/>
               </a:rPr>
-              <a:t>28</a:t>
+              <a:t>29</a:t>
             </a:fld>
             <a:endParaRPr sz="1200">
               <a:solidFill>
@@ -5619,7 +5620,7 @@
                 <a:cs typeface="Arial"/>
                 <a:sym typeface="Arial"/>
               </a:rPr>
-              <a:t>29</a:t>
+              <a:t>30</a:t>
             </a:fld>
             <a:endParaRPr sz="1200">
               <a:solidFill>
@@ -6094,7 +6095,7 @@
                 <a:cs typeface="Calibri"/>
                 <a:sym typeface="Calibri"/>
               </a:rPr>
-              <a:t>30</a:t>
+              <a:t>31</a:t>
             </a:fld>
             <a:endParaRPr sz="1200">
               <a:solidFill>
@@ -6278,7 +6279,7 @@
                 <a:cs typeface="Arial"/>
                 <a:sym typeface="Arial"/>
               </a:rPr>
-              <a:t>31</a:t>
+              <a:t>32</a:t>
             </a:fld>
             <a:endParaRPr sz="1200">
               <a:solidFill>
@@ -6462,7 +6463,7 @@
                 <a:cs typeface="Arial"/>
                 <a:sym typeface="Arial"/>
               </a:rPr>
-              <a:t>32</a:t>
+              <a:t>33</a:t>
             </a:fld>
             <a:endParaRPr sz="1200">
               <a:solidFill>
@@ -6775,10 +6776,10 @@
               <a:buNone/>
             </a:pPr>
             <a:r>
-              <a:rPr lang="en-GB"/>
+              <a:rPr lang="en-GB" dirty="0"/>
               <a:t>A “Thread” or a “Thread of Execution” is defined in computer science as the smallest unit that can be scheduled in an operating system. Threads are normally created by a computer program running on a single processor which then splits (forks) between two or more parallel tasks. The overall task is called a “process”. The threads share the memory and code of the process and the values of its variables.</a:t>
             </a:r>
-            <a:endParaRPr/>
+            <a:endParaRPr dirty="0"/>
           </a:p>
           <a:p>
             <a:pPr marL="0" lvl="0" indent="0" algn="l" rtl="0">
@@ -6790,7 +6791,7 @@
               </a:spcAft>
               <a:buNone/>
             </a:pPr>
-            <a:endParaRPr/>
+            <a:endParaRPr dirty="0"/>
           </a:p>
           <a:p>
             <a:pPr marL="0" lvl="0" indent="0" algn="l" rtl="0">
@@ -6803,10 +6804,10 @@
               <a:buNone/>
             </a:pPr>
             <a:r>
-              <a:rPr lang="en-GB"/>
+              <a:rPr lang="en-GB" dirty="0"/>
               <a:t>REVIEW: Paraphrased threads description from http://www.python-course.eu/threads.php</a:t>
             </a:r>
-            <a:endParaRPr/>
+            <a:endParaRPr dirty="0"/>
           </a:p>
           <a:p>
             <a:pPr marL="0" lvl="0" indent="0" algn="l" rtl="0">
@@ -6818,7 +6819,7 @@
               </a:spcAft>
               <a:buNone/>
             </a:pPr>
-            <a:endParaRPr/>
+            <a:endParaRPr dirty="0"/>
           </a:p>
           <a:p>
             <a:pPr marL="0" lvl="0" indent="0" algn="l" rtl="0">
@@ -6831,10 +6832,10 @@
               <a:buNone/>
             </a:pPr>
             <a:r>
-              <a:rPr lang="en-GB"/>
+              <a:rPr lang="en-GB" dirty="0"/>
               <a:t>REVIEW: Inserted threads graphic</a:t>
             </a:r>
-            <a:endParaRPr/>
+            <a:endParaRPr dirty="0"/>
           </a:p>
           <a:p>
             <a:pPr marL="0" lvl="0" indent="0" algn="l" rtl="0">
@@ -6846,7 +6847,7 @@
               </a:spcAft>
               <a:buNone/>
             </a:pPr>
-            <a:endParaRPr/>
+            <a:endParaRPr dirty="0"/>
           </a:p>
           <a:p>
             <a:pPr marL="0" lvl="0" indent="0" algn="l" rtl="0">
@@ -6859,10 +6860,10 @@
               <a:buNone/>
             </a:pPr>
             <a:r>
-              <a:rPr lang="en-GB"/>
+              <a:rPr lang="en-GB" dirty="0"/>
               <a:t>REVIEW: Highlighted the word “threads” in red.</a:t>
             </a:r>
-            <a:endParaRPr/>
+            <a:endParaRPr dirty="0"/>
           </a:p>
         </p:txBody>
       </p:sp>
@@ -7777,10 +7778,18 @@
               <a:buChar char="•"/>
             </a:pPr>
             <a:r>
-              <a:rPr lang="en-GB"/>
-              <a:t>You could manually split the input list into chunks of 20,000 files. (The “linux” split command can easily do this). You want to perform the same task on each one so now you can run five processes in parallel.</a:t>
-            </a:r>
-            <a:endParaRPr/>
+              <a:rPr lang="en-GB" dirty="0"/>
+              <a:t>You could manually split the input list into chunks of 20,000 files. (The “</a:t>
+            </a:r>
+            <a:r>
+              <a:rPr lang="en-GB" dirty="0" err="1"/>
+              <a:t>linux</a:t>
+            </a:r>
+            <a:r>
+              <a:rPr lang="en-GB" dirty="0"/>
+              <a:t>” split command can easily do this). You want to perform the same task on each one so now you can run five processes in parallel.</a:t>
+            </a:r>
+            <a:endParaRPr dirty="0"/>
           </a:p>
           <a:p>
             <a:pPr marL="171450" lvl="0" indent="-95250" algn="l" rtl="0">
@@ -7797,7 +7806,7 @@
               <a:buFont typeface="Calibri"/>
               <a:buNone/>
             </a:pPr>
-            <a:endParaRPr/>
+            <a:endParaRPr dirty="0"/>
           </a:p>
           <a:p>
             <a:pPr marL="171450" lvl="0" indent="-171450" algn="l" rtl="0">
@@ -7815,10 +7824,10 @@
               <a:buChar char="•"/>
             </a:pPr>
             <a:r>
-              <a:rPr lang="en-GB"/>
+              <a:rPr lang="en-GB" dirty="0"/>
               <a:t>Each process writes its output to a separate file and then another bit of code collects the contents of those files together into a single list.</a:t>
             </a:r>
-            <a:endParaRPr/>
+            <a:endParaRPr dirty="0"/>
           </a:p>
           <a:p>
             <a:pPr marL="171450" lvl="0" indent="-95250" algn="l" rtl="0">
@@ -7835,7 +7844,7 @@
               <a:buFont typeface="Calibri"/>
               <a:buNone/>
             </a:pPr>
-            <a:endParaRPr/>
+            <a:endParaRPr dirty="0"/>
           </a:p>
           <a:p>
             <a:pPr marL="171450" lvl="0" indent="-171450" algn="l" rtl="0">
@@ -7853,10 +7862,10 @@
               <a:buChar char="•"/>
             </a:pPr>
             <a:r>
-              <a:rPr lang="en-GB"/>
+              <a:rPr lang="en-GB" dirty="0"/>
               <a:t>The outcome of this approach is identical to the first, but by dividing the task into logical steps we have allowed the result to be achieved much faster. Each task could run on one core of your desktop computer.</a:t>
             </a:r>
-            <a:endParaRPr/>
+            <a:endParaRPr dirty="0"/>
           </a:p>
         </p:txBody>
       </p:sp>
@@ -13865,6 +13874,339 @@
   <p:cSld>
     <p:spTree>
       <p:nvGrpSpPr>
+        <p:cNvPr id="1" name=""/>
+        <p:cNvGrpSpPr/>
+        <p:nvPr/>
+      </p:nvGrpSpPr>
+      <p:grpSpPr>
+        <a:xfrm>
+          <a:off x="0" y="0"/>
+          <a:ext cx="0" cy="0"/>
+          <a:chOff x="0" y="0"/>
+          <a:chExt cx="0" cy="0"/>
+        </a:xfrm>
+      </p:grpSpPr>
+      <p:sp>
+        <p:nvSpPr>
+          <p:cNvPr id="2" name="Title 1"/>
+          <p:cNvSpPr>
+            <a:spLocks noGrp="1"/>
+          </p:cNvSpPr>
+          <p:nvPr>
+            <p:ph type="title"/>
+          </p:nvPr>
+        </p:nvSpPr>
+        <p:spPr>
+          <a:xfrm>
+            <a:off x="376518" y="130943"/>
+            <a:ext cx="8417858" cy="672621"/>
+          </a:xfrm>
+        </p:spPr>
+        <p:txBody>
+          <a:bodyPr/>
+          <a:lstStyle/>
+          <a:p>
+            <a:r>
+              <a:rPr lang="en-GB" b="1" dirty="0" smtClean="0">
+                <a:latin typeface="Arial Rounded MT Bold" panose="020F0704030504030204" pitchFamily="34" charset="0"/>
+              </a:rPr>
+              <a:t>Getting access to JASMIN</a:t>
+            </a:r>
+            <a:endParaRPr lang="en-GB" b="1" dirty="0">
+              <a:latin typeface="Arial Rounded MT Bold" panose="020F0704030504030204" pitchFamily="34" charset="0"/>
+            </a:endParaRPr>
+          </a:p>
+        </p:txBody>
+      </p:sp>
+      <p:sp>
+        <p:nvSpPr>
+          <p:cNvPr id="3" name="Text Placeholder 2"/>
+          <p:cNvSpPr>
+            <a:spLocks noGrp="1"/>
+          </p:cNvSpPr>
+          <p:nvPr>
+            <p:ph type="body" idx="1"/>
+          </p:nvPr>
+        </p:nvSpPr>
+        <p:spPr>
+          <a:xfrm>
+            <a:off x="263236" y="568029"/>
+            <a:ext cx="8531140" cy="5389426"/>
+          </a:xfrm>
+        </p:spPr>
+        <p:txBody>
+          <a:bodyPr/>
+          <a:lstStyle/>
+          <a:p>
+            <a:r>
+              <a:rPr lang="en-GB" sz="2800" dirty="0" smtClean="0"/>
+              <a:t>Apply for an account:</a:t>
+            </a:r>
+          </a:p>
+          <a:p>
+            <a:pPr marL="114300" indent="0">
+              <a:buNone/>
+            </a:pPr>
+            <a:r>
+              <a:rPr lang="en-GB" b="1" dirty="0" smtClean="0">
+                <a:solidFill>
+                  <a:srgbClr val="0070C0"/>
+                </a:solidFill>
+                <a:hlinkClick r:id="rId2"/>
+              </a:rPr>
+              <a:t>https://help.jasmin.ac.uk/article/189-get-started-with-jasmin</a:t>
+            </a:r>
+            <a:endParaRPr lang="en-GB" b="1" dirty="0" smtClean="0">
+              <a:solidFill>
+                <a:srgbClr val="0070C0"/>
+              </a:solidFill>
+            </a:endParaRPr>
+          </a:p>
+          <a:p>
+            <a:pPr>
+              <a:buFont typeface="Arial" panose="020B0604020202020204" pitchFamily="34" charset="0"/>
+              <a:buChar char="•"/>
+            </a:pPr>
+            <a:r>
+              <a:rPr lang="en-GB" sz="2800" dirty="0" smtClean="0">
+                <a:solidFill>
+                  <a:schemeClr val="tx1"/>
+                </a:solidFill>
+              </a:rPr>
+              <a:t>Generate an </a:t>
+            </a:r>
+            <a:r>
+              <a:rPr lang="en-GB" sz="2800" dirty="0" err="1" smtClean="0">
+                <a:solidFill>
+                  <a:schemeClr val="tx1"/>
+                </a:solidFill>
+              </a:rPr>
+              <a:t>ssh</a:t>
+            </a:r>
+            <a:r>
+              <a:rPr lang="en-GB" sz="2800" dirty="0" smtClean="0">
+                <a:solidFill>
+                  <a:schemeClr val="tx1"/>
+                </a:solidFill>
+              </a:rPr>
+              <a:t> key pair (required)</a:t>
+            </a:r>
+          </a:p>
+          <a:p>
+            <a:pPr>
+              <a:buFont typeface="Arial" panose="020B0604020202020204" pitchFamily="34" charset="0"/>
+              <a:buChar char="•"/>
+            </a:pPr>
+            <a:r>
+              <a:rPr lang="en-GB" sz="2800" dirty="0" smtClean="0">
+                <a:solidFill>
+                  <a:schemeClr val="tx1"/>
+                </a:solidFill>
+              </a:rPr>
+              <a:t>Apply for login access</a:t>
+            </a:r>
+          </a:p>
+          <a:p>
+            <a:pPr>
+              <a:buFont typeface="Arial" panose="020B0604020202020204" pitchFamily="34" charset="0"/>
+              <a:buChar char="•"/>
+            </a:pPr>
+            <a:r>
+              <a:rPr lang="en-GB" sz="2800" dirty="0" smtClean="0">
+                <a:solidFill>
+                  <a:schemeClr val="tx1"/>
+                </a:solidFill>
+              </a:rPr>
+              <a:t>(Optionally) apply for CEDA account, access to project resources, fast data transfer service, etc.</a:t>
+            </a:r>
+          </a:p>
+          <a:p>
+            <a:pPr>
+              <a:buFont typeface="Arial" panose="020B0604020202020204" pitchFamily="34" charset="0"/>
+              <a:buChar char="•"/>
+            </a:pPr>
+            <a:r>
+              <a:rPr lang="en-GB" sz="2800" dirty="0" smtClean="0">
+                <a:solidFill>
+                  <a:schemeClr val="tx1"/>
+                </a:solidFill>
+              </a:rPr>
+              <a:t>Login using your </a:t>
+            </a:r>
+            <a:r>
+              <a:rPr lang="en-GB" sz="2800" dirty="0" err="1" smtClean="0">
+                <a:solidFill>
+                  <a:schemeClr val="tx1"/>
+                </a:solidFill>
+              </a:rPr>
+              <a:t>ssh</a:t>
+            </a:r>
+            <a:r>
+              <a:rPr lang="en-GB" sz="2800" dirty="0" smtClean="0">
+                <a:solidFill>
+                  <a:schemeClr val="tx1"/>
+                </a:solidFill>
+              </a:rPr>
+              <a:t> key</a:t>
+            </a:r>
+          </a:p>
+          <a:p>
+            <a:pPr marL="114300" indent="0">
+              <a:buNone/>
+            </a:pPr>
+            <a:r>
+              <a:rPr lang="en-GB" b="1" dirty="0">
+                <a:solidFill>
+                  <a:srgbClr val="0070C0"/>
+                </a:solidFill>
+                <a:hlinkClick r:id="rId3"/>
+              </a:rPr>
+              <a:t>https://</a:t>
+            </a:r>
+            <a:r>
+              <a:rPr lang="en-GB" b="1" dirty="0" smtClean="0">
+                <a:solidFill>
+                  <a:srgbClr val="0070C0"/>
+                </a:solidFill>
+                <a:hlinkClick r:id="rId3"/>
+              </a:rPr>
+              <a:t>help.jasmin.ac.uk/article/187-login</a:t>
+            </a:r>
+            <a:endParaRPr lang="en-GB" b="1" dirty="0">
+              <a:solidFill>
+                <a:srgbClr val="0070C0"/>
+              </a:solidFill>
+            </a:endParaRPr>
+          </a:p>
+          <a:p>
+            <a:pPr>
+              <a:buFont typeface="Arial" panose="020B0604020202020204" pitchFamily="34" charset="0"/>
+              <a:buChar char="•"/>
+            </a:pPr>
+            <a:r>
+              <a:rPr lang="en-GB" sz="2800" dirty="0" smtClean="0">
+                <a:solidFill>
+                  <a:srgbClr val="0070C0"/>
+                </a:solidFill>
+              </a:rPr>
+              <a:t> </a:t>
+            </a:r>
+            <a:r>
+              <a:rPr lang="en-GB" sz="2800" dirty="0" smtClean="0">
+                <a:solidFill>
+                  <a:srgbClr val="FF0000"/>
+                </a:solidFill>
+              </a:rPr>
+              <a:t>From Windows use </a:t>
+            </a:r>
+            <a:r>
+              <a:rPr lang="en-GB" sz="2800" dirty="0" err="1" smtClean="0">
+                <a:solidFill>
+                  <a:srgbClr val="FF0000"/>
+                </a:solidFill>
+              </a:rPr>
+              <a:t>MobaXterm</a:t>
+            </a:r>
+            <a:r>
+              <a:rPr lang="en-GB" sz="2800" dirty="0" smtClean="0">
+                <a:solidFill>
+                  <a:srgbClr val="FF0000"/>
+                </a:solidFill>
+              </a:rPr>
+              <a:t> – free to download </a:t>
+            </a:r>
+            <a:r>
+              <a:rPr lang="en-GB" sz="2800" dirty="0" smtClean="0">
+                <a:solidFill>
+                  <a:schemeClr val="tx1"/>
+                </a:solidFill>
+              </a:rPr>
+              <a:t>(details on </a:t>
+            </a:r>
+            <a:r>
+              <a:rPr lang="en-GB" sz="2800" dirty="0" err="1" smtClean="0">
+                <a:solidFill>
+                  <a:schemeClr val="tx1"/>
+                </a:solidFill>
+              </a:rPr>
+              <a:t>jasmin</a:t>
+            </a:r>
+            <a:r>
+              <a:rPr lang="en-GB" sz="2800" dirty="0" smtClean="0">
+                <a:solidFill>
+                  <a:schemeClr val="tx1"/>
+                </a:solidFill>
+              </a:rPr>
+              <a:t> login help page)</a:t>
+            </a:r>
+          </a:p>
+          <a:p>
+            <a:r>
+              <a:rPr lang="en-GB" sz="2800" dirty="0" err="1">
+                <a:solidFill>
+                  <a:schemeClr val="tx1"/>
+                </a:solidFill>
+              </a:rPr>
+              <a:t>s</a:t>
+            </a:r>
+            <a:r>
+              <a:rPr lang="en-GB" sz="2800" dirty="0" err="1" smtClean="0">
+                <a:solidFill>
+                  <a:schemeClr val="tx1"/>
+                </a:solidFill>
+              </a:rPr>
+              <a:t>sh</a:t>
+            </a:r>
+            <a:r>
+              <a:rPr lang="en-GB" sz="2800" dirty="0" smtClean="0">
+                <a:solidFill>
+                  <a:schemeClr val="tx1"/>
+                </a:solidFill>
+              </a:rPr>
+              <a:t> to </a:t>
+            </a:r>
+            <a:r>
+              <a:rPr lang="en-GB" sz="2800" dirty="0" err="1" smtClean="0">
+                <a:solidFill>
+                  <a:schemeClr val="tx1"/>
+                </a:solidFill>
+              </a:rPr>
+              <a:t>sci</a:t>
+            </a:r>
+            <a:r>
+              <a:rPr lang="en-GB" sz="2800" dirty="0" smtClean="0">
+                <a:solidFill>
+                  <a:schemeClr val="tx1"/>
+                </a:solidFill>
+              </a:rPr>
+              <a:t> machine / project VM / lotus head node</a:t>
+            </a:r>
+            <a:endParaRPr lang="en-GB" sz="2800" dirty="0">
+              <a:solidFill>
+                <a:schemeClr val="tx1"/>
+              </a:solidFill>
+            </a:endParaRPr>
+          </a:p>
+        </p:txBody>
+      </p:sp>
+    </p:spTree>
+    <p:extLst>
+      <p:ext uri="{BB962C8B-B14F-4D97-AF65-F5344CB8AC3E}">
+        <p14:creationId xmlns:p14="http://schemas.microsoft.com/office/powerpoint/2010/main" val="1804760311"/>
+      </p:ext>
+    </p:extLst>
+  </p:cSld>
+  <p:clrMapOvr>
+    <a:masterClrMapping/>
+  </p:clrMapOvr>
+</p:sld>
+</file>
+
+<file path=ppt/slides/slide15.xml><?xml version="1.0" encoding="utf-8"?>
+<p:sld xmlns:a="http://schemas.openxmlformats.org/drawingml/2006/main" xmlns:r="http://schemas.openxmlformats.org/officeDocument/2006/relationships" xmlns:p="http://schemas.openxmlformats.org/presentationml/2006/main">
+  <p:cSld>
+    <p:spTree>
+      <p:nvGrpSpPr>
         <p:cNvPr id="1" name="Shape 237"/>
         <p:cNvGrpSpPr/>
         <p:nvPr/>
@@ -14196,7 +14538,7 @@
 </p:sld>
 </file>
 
-<file path=ppt/slides/slide15.xml><?xml version="1.0" encoding="utf-8"?>
+<file path=ppt/slides/slide16.xml><?xml version="1.0" encoding="utf-8"?>
 <p:sld xmlns:a="http://schemas.openxmlformats.org/drawingml/2006/main" xmlns:r="http://schemas.openxmlformats.org/officeDocument/2006/relationships" xmlns:p="http://schemas.openxmlformats.org/presentationml/2006/main">
   <p:cSld>
     <p:spTree>
@@ -14881,7 +15223,7 @@
 </p:sld>
 </file>
 
-<file path=ppt/slides/slide16.xml><?xml version="1.0" encoding="utf-8"?>
+<file path=ppt/slides/slide17.xml><?xml version="1.0" encoding="utf-8"?>
 <p:sld xmlns:a="http://schemas.openxmlformats.org/drawingml/2006/main" xmlns:r="http://schemas.openxmlformats.org/officeDocument/2006/relationships" xmlns:p="http://schemas.openxmlformats.org/presentationml/2006/main">
   <p:cSld>
     <p:spTree>
@@ -15010,7 +15352,15 @@
             </a:pPr>
             <a:r>
               <a:rPr lang="en-GB" sz="2800" b="1" dirty="0"/>
-              <a:t>What is a batch processing?</a:t>
+              <a:t>What </a:t>
+            </a:r>
+            <a:r>
+              <a:rPr lang="en-GB" sz="2800" b="1" dirty="0" smtClean="0"/>
+              <a:t>is </a:t>
+            </a:r>
+            <a:r>
+              <a:rPr lang="en-GB" sz="2800" b="1" dirty="0"/>
+              <a:t>batch processing?</a:t>
             </a:r>
             <a:endParaRPr sz="2800" b="1" dirty="0"/>
           </a:p>
@@ -15213,7 +15563,15 @@
                   <a:srgbClr val="032044"/>
                 </a:solidFill>
               </a:rPr>
-              <a:t>User does</a:t>
+              <a:t>User does </a:t>
+            </a:r>
+            <a:r>
+              <a:rPr lang="en-GB" dirty="0">
+                <a:solidFill>
+                  <a:srgbClr val="032044"/>
+                </a:solidFill>
+              </a:rPr>
+              <a:t>not login to </a:t>
             </a:r>
             <a:r>
               <a:rPr lang="en-GB" dirty="0" smtClean="0">
@@ -15221,7 +15579,7 @@
                   <a:srgbClr val="032044"/>
                 </a:solidFill>
               </a:rPr>
-              <a:t> </a:t>
+              <a:t>a compute </a:t>
             </a:r>
             <a:r>
               <a:rPr lang="en-GB" dirty="0">
@@ -15229,7 +15587,7 @@
                   <a:srgbClr val="032044"/>
                 </a:solidFill>
               </a:rPr>
-              <a:t>not login to </a:t>
+              <a:t>node directly </a:t>
             </a:r>
             <a:r>
               <a:rPr lang="en-GB" dirty="0" smtClean="0">
@@ -15237,31 +15595,7 @@
                   <a:srgbClr val="032044"/>
                 </a:solidFill>
               </a:rPr>
-              <a:t>a compute </a:t>
-            </a:r>
-            <a:r>
-              <a:rPr lang="en-GB" dirty="0">
-                <a:solidFill>
-                  <a:srgbClr val="032044"/>
-                </a:solidFill>
-              </a:rPr>
-              <a:t>node directly </a:t>
-            </a:r>
-            <a:r>
-              <a:rPr lang="en-GB" dirty="0" smtClean="0">
-                <a:solidFill>
-                  <a:srgbClr val="032044"/>
-                </a:solidFill>
-              </a:rPr>
-              <a:t>and </a:t>
-            </a:r>
-            <a:r>
-              <a:rPr lang="en-GB" dirty="0" smtClean="0">
-                <a:solidFill>
-                  <a:srgbClr val="032044"/>
-                </a:solidFill>
-              </a:rPr>
-              <a:t>type individual commands</a:t>
+              <a:t>and type individual commands</a:t>
             </a:r>
             <a:endParaRPr dirty="0">
               <a:solidFill>
@@ -15430,7 +15764,7 @@
 </p:sld>
 </file>
 
-<file path=ppt/slides/slide17.xml><?xml version="1.0" encoding="utf-8"?>
+<file path=ppt/slides/slide18.xml><?xml version="1.0" encoding="utf-8"?>
 <p:sld xmlns:a="http://schemas.openxmlformats.org/drawingml/2006/main" xmlns:r="http://schemas.openxmlformats.org/officeDocument/2006/relationships" xmlns:p="http://schemas.openxmlformats.org/presentationml/2006/main">
   <p:cSld>
     <p:spTree>
@@ -15716,7 +16050,7 @@
 </p:sld>
 </file>
 
-<file path=ppt/slides/slide18.xml><?xml version="1.0" encoding="utf-8"?>
+<file path=ppt/slides/slide19.xml><?xml version="1.0" encoding="utf-8"?>
 <p:sld xmlns:a="http://schemas.openxmlformats.org/drawingml/2006/main" xmlns:r="http://schemas.openxmlformats.org/officeDocument/2006/relationships" xmlns:p="http://schemas.openxmlformats.org/presentationml/2006/main">
   <p:cSld>
     <p:spTree>
@@ -16148,1578 +16482,6 @@
               <a:buNone/>
             </a:pPr>
             <a:endParaRPr sz="2400" dirty="0"/>
-          </a:p>
-        </p:txBody>
-      </p:sp>
-    </p:spTree>
-  </p:cSld>
-  <p:clrMapOvr>
-    <a:masterClrMapping/>
-  </p:clrMapOvr>
-  <p:timing>
-    <p:tnLst>
-      <p:par>
-        <p:cTn id="1" dur="indefinite" restart="never" nodeType="tmRoot"/>
-      </p:par>
-    </p:tnLst>
-  </p:timing>
-</p:sld>
-</file>
-
-<file path=ppt/slides/slide19.xml><?xml version="1.0" encoding="utf-8"?>
-<p:sld xmlns:a="http://schemas.openxmlformats.org/drawingml/2006/main" xmlns:r="http://schemas.openxmlformats.org/officeDocument/2006/relationships" xmlns:p="http://schemas.openxmlformats.org/presentationml/2006/main">
-  <p:cSld>
-    <p:spTree>
-      <p:nvGrpSpPr>
-        <p:cNvPr id="1" name="Shape 308"/>
-        <p:cNvGrpSpPr/>
-        <p:nvPr/>
-      </p:nvGrpSpPr>
-      <p:grpSpPr>
-        <a:xfrm>
-          <a:off x="0" y="0"/>
-          <a:ext cx="0" cy="0"/>
-          <a:chOff x="0" y="0"/>
-          <a:chExt cx="0" cy="0"/>
-        </a:xfrm>
-      </p:grpSpPr>
-      <p:sp>
-        <p:nvSpPr>
-          <p:cNvPr id="309" name="Google Shape;309;p42"/>
-          <p:cNvSpPr txBox="1">
-            <a:spLocks noGrp="1"/>
-          </p:cNvSpPr>
-          <p:nvPr>
-            <p:ph type="title"/>
-          </p:nvPr>
-        </p:nvSpPr>
-        <p:spPr>
-          <a:xfrm>
-            <a:off x="457200" y="122238"/>
-            <a:ext cx="8229600" cy="562200"/>
-          </a:xfrm>
-          <a:prstGeom prst="rect">
-            <a:avLst/>
-          </a:prstGeom>
-          <a:noFill/>
-          <a:ln>
-            <a:noFill/>
-          </a:ln>
-        </p:spPr>
-        <p:txBody>
-          <a:bodyPr spcFirstLastPara="1" wrap="square" lIns="91425" tIns="45700" rIns="91425" bIns="45700" anchor="ctr" anchorCtr="0">
-            <a:noAutofit/>
-          </a:bodyPr>
-          <a:lstStyle/>
-          <a:p>
-            <a:pPr marL="0" lvl="0" indent="0" algn="ctr" rtl="0">
-              <a:lnSpc>
-                <a:spcPct val="90000"/>
-              </a:lnSpc>
-              <a:spcBef>
-                <a:spcPts val="0"/>
-              </a:spcBef>
-              <a:spcAft>
-                <a:spcPts val="0"/>
-              </a:spcAft>
-              <a:buClr>
-                <a:srgbClr val="000000"/>
-              </a:buClr>
-              <a:buSzPts val="3200"/>
-              <a:buFont typeface="Calibri"/>
-              <a:buNone/>
-            </a:pPr>
-            <a:r>
-              <a:rPr lang="en-GB" sz="3200" b="1" dirty="0" smtClean="0">
-                <a:latin typeface="Arial Rounded MT Bold" panose="020F0704030504030204" pitchFamily="34" charset="0"/>
-              </a:rPr>
-              <a:t>LSF Scheduler comm</a:t>
-            </a:r>
-            <a:r>
-              <a:rPr lang="en-GB" sz="3200" b="1" dirty="0" smtClean="0"/>
-              <a:t>ands</a:t>
-            </a:r>
-            <a:endParaRPr sz="3200" b="1" dirty="0"/>
-          </a:p>
-        </p:txBody>
-      </p:sp>
-      <p:sp>
-        <p:nvSpPr>
-          <p:cNvPr id="310" name="Google Shape;310;p42"/>
-          <p:cNvSpPr txBox="1">
-            <a:spLocks noGrp="1"/>
-          </p:cNvSpPr>
-          <p:nvPr>
-            <p:ph type="body" idx="1"/>
-          </p:nvPr>
-        </p:nvSpPr>
-        <p:spPr>
-          <a:xfrm>
-            <a:off x="0" y="745292"/>
-            <a:ext cx="9033164" cy="5256600"/>
-          </a:xfrm>
-          <a:prstGeom prst="rect">
-            <a:avLst/>
-          </a:prstGeom>
-          <a:noFill/>
-          <a:ln>
-            <a:noFill/>
-          </a:ln>
-        </p:spPr>
-        <p:txBody>
-          <a:bodyPr spcFirstLastPara="1" wrap="square" lIns="91425" tIns="45700" rIns="91425" bIns="45700" anchor="t" anchorCtr="0">
-            <a:noAutofit/>
-          </a:bodyPr>
-          <a:lstStyle/>
-          <a:p>
-            <a:pPr marL="228600" lvl="0" indent="-228600" algn="l" rtl="0">
-              <a:lnSpc>
-                <a:spcPct val="90000"/>
-              </a:lnSpc>
-              <a:spcBef>
-                <a:spcPts val="0"/>
-              </a:spcBef>
-              <a:spcAft>
-                <a:spcPts val="0"/>
-              </a:spcAft>
-              <a:buClr>
-                <a:srgbClr val="000000"/>
-              </a:buClr>
-              <a:buSzPts val="2800"/>
-              <a:buFont typeface="Arial"/>
-              <a:buNone/>
-            </a:pPr>
-            <a:r>
-              <a:rPr lang="en-GB" b="1" dirty="0" smtClean="0">
-                <a:solidFill>
-                  <a:srgbClr val="000000"/>
-                </a:solidFill>
-              </a:rPr>
-              <a:t>To interact with the LOTUS LSF scheduler first login to one of</a:t>
-            </a:r>
-            <a:r>
-              <a:rPr lang="en-GB" b="1" dirty="0" smtClean="0">
-                <a:solidFill>
-                  <a:srgbClr val="000000"/>
-                </a:solidFill>
-              </a:rPr>
-              <a:t>:</a:t>
-            </a:r>
-          </a:p>
-          <a:p>
-            <a:pPr marL="342900" lvl="0" algn="l" rtl="0">
-              <a:lnSpc>
-                <a:spcPct val="90000"/>
-              </a:lnSpc>
-              <a:spcBef>
-                <a:spcPts val="0"/>
-              </a:spcBef>
-              <a:spcAft>
-                <a:spcPts val="0"/>
-              </a:spcAft>
-              <a:buClr>
-                <a:srgbClr val="000000"/>
-              </a:buClr>
-              <a:buSzPts val="2800"/>
-              <a:buFont typeface="Arial" panose="020B0604020202020204" pitchFamily="34" charset="0"/>
-              <a:buChar char="•"/>
-            </a:pPr>
-            <a:r>
-              <a:rPr lang="en-GB" dirty="0" smtClean="0">
-                <a:solidFill>
-                  <a:srgbClr val="000000"/>
-                </a:solidFill>
-              </a:rPr>
-              <a:t>JASMIN </a:t>
-            </a:r>
-            <a:r>
-              <a:rPr lang="en-GB" dirty="0">
-                <a:solidFill>
-                  <a:srgbClr val="000000"/>
-                </a:solidFill>
-              </a:rPr>
-              <a:t>scientific servers </a:t>
-            </a:r>
-            <a:r>
-              <a:rPr lang="en-GB" dirty="0" smtClean="0">
-                <a:solidFill>
-                  <a:srgbClr val="000000"/>
-                </a:solidFill>
-              </a:rPr>
-              <a:t>(</a:t>
-            </a:r>
-            <a:r>
-              <a:rPr lang="en-GB" dirty="0" err="1" smtClean="0">
-                <a:solidFill>
-                  <a:schemeClr val="tx1"/>
-                </a:solidFill>
-                <a:latin typeface="Calibri" panose="020F0502020204030204" pitchFamily="34" charset="0"/>
-                <a:ea typeface="Courier New"/>
-                <a:cs typeface="Calibri" panose="020F0502020204030204" pitchFamily="34" charset="0"/>
-                <a:sym typeface="Courier New"/>
-              </a:rPr>
-              <a:t>jasmin-sci</a:t>
-            </a:r>
-            <a:r>
-              <a:rPr lang="en-GB" b="1" dirty="0" smtClean="0">
-                <a:solidFill>
-                  <a:schemeClr val="tx1"/>
-                </a:solidFill>
-                <a:latin typeface="Calibri" panose="020F0502020204030204" pitchFamily="34" charset="0"/>
-                <a:ea typeface="Courier New"/>
-                <a:cs typeface="Calibri" panose="020F0502020204030204" pitchFamily="34" charset="0"/>
-                <a:sym typeface="Courier New"/>
-              </a:rPr>
-              <a:t>[</a:t>
-            </a:r>
-            <a:r>
-              <a:rPr lang="en-GB" dirty="0" smtClean="0">
-                <a:solidFill>
-                  <a:schemeClr val="tx1"/>
-                </a:solidFill>
-                <a:latin typeface="Calibri" panose="020F0502020204030204" pitchFamily="34" charset="0"/>
-                <a:ea typeface="Courier New"/>
-                <a:cs typeface="Calibri" panose="020F0502020204030204" pitchFamily="34" charset="0"/>
-                <a:sym typeface="Courier New"/>
-              </a:rPr>
-              <a:t>1-5</a:t>
-            </a:r>
-            <a:r>
-              <a:rPr lang="en-GB" b="1" dirty="0">
-                <a:solidFill>
-                  <a:schemeClr val="tx1"/>
-                </a:solidFill>
-                <a:latin typeface="Calibri" panose="020F0502020204030204" pitchFamily="34" charset="0"/>
-                <a:ea typeface="Courier New"/>
-                <a:cs typeface="Calibri" panose="020F0502020204030204" pitchFamily="34" charset="0"/>
-                <a:sym typeface="Courier New"/>
-              </a:rPr>
-              <a:t>]</a:t>
-            </a:r>
-            <a:r>
-              <a:rPr lang="en-GB" dirty="0">
-                <a:solidFill>
-                  <a:schemeClr val="tx1"/>
-                </a:solidFill>
-                <a:latin typeface="Calibri" panose="020F0502020204030204" pitchFamily="34" charset="0"/>
-                <a:ea typeface="Courier New"/>
-                <a:cs typeface="Calibri" panose="020F0502020204030204" pitchFamily="34" charset="0"/>
-                <a:sym typeface="Courier New"/>
-              </a:rPr>
-              <a:t>.</a:t>
-            </a:r>
-            <a:r>
-              <a:rPr lang="en-GB" dirty="0" smtClean="0">
-                <a:solidFill>
-                  <a:schemeClr val="tx1"/>
-                </a:solidFill>
-                <a:latin typeface="Calibri" panose="020F0502020204030204" pitchFamily="34" charset="0"/>
-                <a:ea typeface="Courier New"/>
-                <a:cs typeface="Calibri" panose="020F0502020204030204" pitchFamily="34" charset="0"/>
-                <a:sym typeface="Courier New"/>
-              </a:rPr>
-              <a:t>ceda.ac.uk)</a:t>
-            </a:r>
-          </a:p>
-          <a:p>
-            <a:pPr marL="342900" lvl="0" algn="l" rtl="0">
-              <a:lnSpc>
-                <a:spcPct val="90000"/>
-              </a:lnSpc>
-              <a:spcBef>
-                <a:spcPts val="0"/>
-              </a:spcBef>
-              <a:spcAft>
-                <a:spcPts val="0"/>
-              </a:spcAft>
-              <a:buClr>
-                <a:srgbClr val="000000"/>
-              </a:buClr>
-              <a:buSzPts val="2800"/>
-              <a:buFont typeface="Arial" panose="020B0604020202020204" pitchFamily="34" charset="0"/>
-              <a:buChar char="•"/>
-            </a:pPr>
-            <a:r>
-              <a:rPr lang="en-GB" dirty="0" smtClean="0">
-                <a:solidFill>
-                  <a:srgbClr val="000000"/>
-                </a:solidFill>
-              </a:rPr>
-              <a:t>LOTUS </a:t>
-            </a:r>
-            <a:r>
-              <a:rPr lang="en-GB" dirty="0">
-                <a:solidFill>
-                  <a:srgbClr val="000000"/>
-                </a:solidFill>
-              </a:rPr>
-              <a:t>head </a:t>
-            </a:r>
-            <a:r>
-              <a:rPr lang="en-GB" dirty="0" smtClean="0">
-                <a:solidFill>
-                  <a:srgbClr val="000000"/>
-                </a:solidFill>
-              </a:rPr>
-              <a:t>node</a:t>
-            </a:r>
-            <a:r>
-              <a:rPr lang="en-GB" dirty="0">
-                <a:solidFill>
-                  <a:srgbClr val="000000"/>
-                </a:solidFill>
-              </a:rPr>
-              <a:t> </a:t>
-            </a:r>
-            <a:r>
-              <a:rPr lang="en-GB" dirty="0" smtClean="0">
-                <a:solidFill>
-                  <a:srgbClr val="000000"/>
-                </a:solidFill>
-              </a:rPr>
-              <a:t>(</a:t>
-            </a:r>
-            <a:r>
-              <a:rPr lang="en-GB" dirty="0" smtClean="0">
-                <a:solidFill>
-                  <a:schemeClr val="tx1"/>
-                </a:solidFill>
-                <a:latin typeface="Calibri" panose="020F0502020204030204" pitchFamily="34" charset="0"/>
-                <a:cs typeface="Calibri" panose="020F0502020204030204" pitchFamily="34" charset="0"/>
-              </a:rPr>
-              <a:t>l</a:t>
-            </a:r>
-            <a:r>
-              <a:rPr lang="en-GB" dirty="0" smtClean="0">
-                <a:solidFill>
-                  <a:schemeClr val="tx1"/>
-                </a:solidFill>
-                <a:latin typeface="Calibri" panose="020F0502020204030204" pitchFamily="34" charset="0"/>
-                <a:ea typeface="Courier New"/>
-                <a:cs typeface="Calibri" panose="020F0502020204030204" pitchFamily="34" charset="0"/>
-                <a:sym typeface="Courier New"/>
-              </a:rPr>
-              <a:t>otus.jc.rl.ac.uk</a:t>
-            </a:r>
-            <a:r>
-              <a:rPr lang="en-GB" dirty="0" smtClean="0">
-                <a:solidFill>
-                  <a:schemeClr val="tx1"/>
-                </a:solidFill>
-                <a:latin typeface="Courier New"/>
-                <a:ea typeface="Courier New"/>
-                <a:cs typeface="Courier New"/>
-                <a:sym typeface="Courier New"/>
-              </a:rPr>
-              <a:t>)</a:t>
-            </a:r>
-            <a:endParaRPr dirty="0"/>
-          </a:p>
-          <a:p>
-            <a:pPr marL="228600" lvl="0" indent="-228600" algn="l" rtl="0">
-              <a:lnSpc>
-                <a:spcPct val="90000"/>
-              </a:lnSpc>
-              <a:spcBef>
-                <a:spcPts val="1000"/>
-              </a:spcBef>
-              <a:spcAft>
-                <a:spcPts val="0"/>
-              </a:spcAft>
-              <a:buClr>
-                <a:srgbClr val="000000"/>
-              </a:buClr>
-              <a:buSzPts val="2400"/>
-              <a:buFont typeface="Arial"/>
-              <a:buNone/>
-            </a:pPr>
-            <a:r>
-              <a:rPr lang="en-GB" b="1" dirty="0" smtClean="0"/>
-              <a:t>Job submission: </a:t>
-            </a:r>
-            <a:r>
-              <a:rPr lang="en-GB" b="1" dirty="0" err="1" smtClean="0">
-                <a:latin typeface="Courier New" panose="02070309020205020404" pitchFamily="49" charset="0"/>
-                <a:cs typeface="Courier New" panose="02070309020205020404" pitchFamily="49" charset="0"/>
-              </a:rPr>
-              <a:t>bsub</a:t>
-            </a:r>
-            <a:r>
-              <a:rPr lang="en-GB" b="1" dirty="0" smtClean="0">
-                <a:latin typeface="Courier New" panose="02070309020205020404" pitchFamily="49" charset="0"/>
-                <a:cs typeface="Courier New" panose="02070309020205020404" pitchFamily="49" charset="0"/>
-              </a:rPr>
-              <a:t> &lt;options&gt; command</a:t>
-            </a:r>
-            <a:endParaRPr lang="en-GB" sz="1000" b="1" dirty="0">
-              <a:latin typeface="Courier New" panose="02070309020205020404" pitchFamily="49" charset="0"/>
-              <a:cs typeface="Courier New" panose="02070309020205020404" pitchFamily="49" charset="0"/>
-            </a:endParaRPr>
-          </a:p>
-          <a:p>
-            <a:pPr marL="228600" lvl="0" indent="-228600" algn="l" rtl="0">
-              <a:lnSpc>
-                <a:spcPct val="90000"/>
-              </a:lnSpc>
-              <a:spcBef>
-                <a:spcPts val="1000"/>
-              </a:spcBef>
-              <a:spcAft>
-                <a:spcPts val="0"/>
-              </a:spcAft>
-              <a:buClr>
-                <a:srgbClr val="000000"/>
-              </a:buClr>
-              <a:buSzPts val="2400"/>
-              <a:buFont typeface="Arial"/>
-              <a:buNone/>
-            </a:pPr>
-            <a:endParaRPr sz="800" b="1" dirty="0">
-              <a:latin typeface="Courier New" panose="02070309020205020404" pitchFamily="49" charset="0"/>
-              <a:cs typeface="Courier New" panose="02070309020205020404" pitchFamily="49" charset="0"/>
-            </a:endParaRPr>
-          </a:p>
-          <a:p>
-            <a:pPr marL="0" lvl="0" indent="0" rtl="0">
-              <a:lnSpc>
-                <a:spcPct val="80000"/>
-              </a:lnSpc>
-              <a:spcBef>
-                <a:spcPts val="304"/>
-              </a:spcBef>
-              <a:spcAft>
-                <a:spcPts val="0"/>
-              </a:spcAft>
-              <a:buClr>
-                <a:schemeClr val="dk1"/>
-              </a:buClr>
-              <a:buSzPts val="1100"/>
-              <a:buFont typeface="Arial"/>
-              <a:buNone/>
-            </a:pPr>
-            <a:r>
-              <a:rPr lang="en-GB" sz="2000" dirty="0" smtClean="0">
-                <a:solidFill>
-                  <a:srgbClr val="032044"/>
-                </a:solidFill>
-                <a:latin typeface="Courier"/>
-                <a:ea typeface="Courier New"/>
-                <a:cs typeface="Courier New"/>
-                <a:sym typeface="Courier New"/>
-              </a:rPr>
-              <a:t>  </a:t>
-            </a:r>
-            <a:r>
-              <a:rPr lang="en-GB" sz="1800" dirty="0" smtClean="0">
-                <a:solidFill>
-                  <a:srgbClr val="032044"/>
-                </a:solidFill>
-                <a:latin typeface="Courier"/>
-                <a:ea typeface="Courier New"/>
-                <a:cs typeface="Courier New"/>
-                <a:sym typeface="Courier New"/>
-              </a:rPr>
-              <a:t>$ </a:t>
-            </a:r>
-            <a:r>
-              <a:rPr lang="en-GB" sz="1800" b="1" dirty="0" err="1">
-                <a:solidFill>
-                  <a:srgbClr val="032044"/>
-                </a:solidFill>
-                <a:latin typeface="Courier New" panose="02070309020205020404" pitchFamily="49" charset="0"/>
-                <a:ea typeface="Courier New"/>
-                <a:cs typeface="Courier New" panose="02070309020205020404" pitchFamily="49" charset="0"/>
-                <a:sym typeface="Courier New"/>
-              </a:rPr>
-              <a:t>bsub</a:t>
-            </a:r>
-            <a:r>
-              <a:rPr lang="en-GB" sz="1800" dirty="0">
-                <a:solidFill>
-                  <a:srgbClr val="032044"/>
-                </a:solidFill>
-                <a:latin typeface="Courier New" panose="02070309020205020404" pitchFamily="49" charset="0"/>
-                <a:ea typeface="Courier New"/>
-                <a:cs typeface="Courier New" panose="02070309020205020404" pitchFamily="49" charset="0"/>
-                <a:sym typeface="Courier New"/>
-              </a:rPr>
-              <a:t> -o %</a:t>
-            </a:r>
-            <a:r>
-              <a:rPr lang="en-GB" sz="1800" dirty="0" err="1">
-                <a:solidFill>
-                  <a:srgbClr val="032044"/>
-                </a:solidFill>
-                <a:latin typeface="Courier New" panose="02070309020205020404" pitchFamily="49" charset="0"/>
-                <a:ea typeface="Courier New"/>
-                <a:cs typeface="Courier New" panose="02070309020205020404" pitchFamily="49" charset="0"/>
-                <a:sym typeface="Courier New"/>
-              </a:rPr>
-              <a:t>J.out</a:t>
-            </a:r>
-            <a:r>
-              <a:rPr lang="en-GB" sz="1800" dirty="0">
-                <a:solidFill>
-                  <a:srgbClr val="032044"/>
-                </a:solidFill>
-                <a:latin typeface="Courier New" panose="02070309020205020404" pitchFamily="49" charset="0"/>
-                <a:ea typeface="Courier New"/>
-                <a:cs typeface="Courier New" panose="02070309020205020404" pitchFamily="49" charset="0"/>
-                <a:sym typeface="Courier New"/>
-              </a:rPr>
-              <a:t> -W 00:10 python2.7 </a:t>
-            </a:r>
-            <a:r>
-              <a:rPr lang="en-GB" sz="1800" b="1" dirty="0" smtClean="0">
-                <a:solidFill>
-                  <a:srgbClr val="032044"/>
-                </a:solidFill>
-                <a:latin typeface="Courier New" panose="02070309020205020404" pitchFamily="49" charset="0"/>
-                <a:ea typeface="Courier New"/>
-                <a:cs typeface="Courier New" panose="02070309020205020404" pitchFamily="49" charset="0"/>
-                <a:sym typeface="Courier New"/>
-              </a:rPr>
-              <a:t>mypythonscript.py</a:t>
-            </a:r>
-            <a:endParaRPr sz="1800" b="1" dirty="0">
-              <a:solidFill>
-                <a:srgbClr val="032044"/>
-              </a:solidFill>
-              <a:latin typeface="Courier New" panose="02070309020205020404" pitchFamily="49" charset="0"/>
-              <a:ea typeface="Courier New"/>
-              <a:cs typeface="Courier New" panose="02070309020205020404" pitchFamily="49" charset="0"/>
-              <a:sym typeface="Courier New"/>
-            </a:endParaRPr>
-          </a:p>
-          <a:p>
-            <a:pPr marL="0" lvl="0" indent="0" rtl="0">
-              <a:lnSpc>
-                <a:spcPct val="80000"/>
-              </a:lnSpc>
-              <a:spcBef>
-                <a:spcPts val="304"/>
-              </a:spcBef>
-              <a:spcAft>
-                <a:spcPts val="0"/>
-              </a:spcAft>
-              <a:buClr>
-                <a:schemeClr val="dk1"/>
-              </a:buClr>
-              <a:buSzPts val="1100"/>
-              <a:buFont typeface="Arial"/>
-              <a:buNone/>
-            </a:pPr>
-            <a:r>
-              <a:rPr lang="en-GB" sz="1800" dirty="0" smtClean="0">
-                <a:solidFill>
-                  <a:srgbClr val="032044"/>
-                </a:solidFill>
-                <a:latin typeface="Courier New" panose="02070309020205020404" pitchFamily="49" charset="0"/>
-                <a:ea typeface="Courier New"/>
-                <a:cs typeface="Courier New" panose="02070309020205020404" pitchFamily="49" charset="0"/>
-                <a:sym typeface="Courier New"/>
-              </a:rPr>
-              <a:t>  Job </a:t>
-            </a:r>
-            <a:r>
-              <a:rPr lang="en-GB" sz="1800" dirty="0">
-                <a:solidFill>
-                  <a:srgbClr val="032044"/>
-                </a:solidFill>
-                <a:latin typeface="Courier New" panose="02070309020205020404" pitchFamily="49" charset="0"/>
-                <a:ea typeface="Courier New"/>
-                <a:cs typeface="Courier New" panose="02070309020205020404" pitchFamily="49" charset="0"/>
-                <a:sym typeface="Courier New"/>
-              </a:rPr>
-              <a:t>&lt;6485340&gt; is submitted to default queue &lt;short-serial&gt;.</a:t>
-            </a:r>
-            <a:endParaRPr sz="1800" dirty="0">
-              <a:solidFill>
-                <a:srgbClr val="032044"/>
-              </a:solidFill>
-              <a:latin typeface="Courier New" panose="02070309020205020404" pitchFamily="49" charset="0"/>
-              <a:ea typeface="Courier New"/>
-              <a:cs typeface="Courier New" panose="02070309020205020404" pitchFamily="49" charset="0"/>
-              <a:sym typeface="Courier New"/>
-            </a:endParaRPr>
-          </a:p>
-          <a:p>
-            <a:pPr marL="228600" lvl="0" indent="-228600" algn="l" rtl="0">
-              <a:lnSpc>
-                <a:spcPct val="90000"/>
-              </a:lnSpc>
-              <a:spcBef>
-                <a:spcPts val="1000"/>
-              </a:spcBef>
-              <a:spcAft>
-                <a:spcPts val="0"/>
-              </a:spcAft>
-              <a:buClr>
-                <a:schemeClr val="dk1"/>
-              </a:buClr>
-              <a:buSzPts val="800"/>
-              <a:buFont typeface="Arial"/>
-              <a:buNone/>
-            </a:pPr>
-            <a:endParaRPr sz="800" dirty="0">
-              <a:solidFill>
-                <a:srgbClr val="000000"/>
-              </a:solidFill>
-              <a:latin typeface="Courier"/>
-            </a:endParaRPr>
-          </a:p>
-          <a:p>
-            <a:pPr marL="0" lvl="0" indent="0" algn="l" rtl="0">
-              <a:lnSpc>
-                <a:spcPct val="80000"/>
-              </a:lnSpc>
-              <a:spcBef>
-                <a:spcPts val="0"/>
-              </a:spcBef>
-              <a:spcAft>
-                <a:spcPts val="0"/>
-              </a:spcAft>
-              <a:buClr>
-                <a:srgbClr val="032044"/>
-              </a:buClr>
-              <a:buSzPts val="2400"/>
-              <a:buFont typeface="Arial"/>
-              <a:buNone/>
-            </a:pPr>
-            <a:r>
-              <a:rPr lang="en-GB" b="1" dirty="0">
-                <a:solidFill>
-                  <a:srgbClr val="032044"/>
-                </a:solidFill>
-              </a:rPr>
-              <a:t>Job information:</a:t>
-            </a:r>
-            <a:r>
-              <a:rPr lang="en-GB" sz="1520" b="1" dirty="0">
-                <a:solidFill>
-                  <a:srgbClr val="032044"/>
-                </a:solidFill>
-                <a:latin typeface="Courier New"/>
-                <a:ea typeface="Courier New"/>
-                <a:cs typeface="Courier New"/>
-                <a:sym typeface="Courier New"/>
-              </a:rPr>
-              <a:t> </a:t>
-            </a:r>
-            <a:r>
-              <a:rPr lang="en-GB" b="1" dirty="0" err="1">
-                <a:solidFill>
-                  <a:srgbClr val="032044"/>
-                </a:solidFill>
-                <a:latin typeface="Courier New"/>
-                <a:ea typeface="Courier New"/>
-                <a:cs typeface="Courier New"/>
-                <a:sym typeface="Courier New"/>
-              </a:rPr>
-              <a:t>bjobs</a:t>
-            </a:r>
-            <a:endParaRPr b="1" dirty="0">
-              <a:solidFill>
-                <a:srgbClr val="032044"/>
-              </a:solidFill>
-            </a:endParaRPr>
-          </a:p>
-          <a:p>
-            <a:pPr marL="0" lvl="0" indent="0" algn="l" rtl="0">
-              <a:lnSpc>
-                <a:spcPct val="80000"/>
-              </a:lnSpc>
-              <a:spcBef>
-                <a:spcPts val="400"/>
-              </a:spcBef>
-              <a:spcAft>
-                <a:spcPts val="0"/>
-              </a:spcAft>
-              <a:buClr>
-                <a:srgbClr val="032044"/>
-              </a:buClr>
-              <a:buSzPts val="2000"/>
-              <a:buNone/>
-            </a:pPr>
-            <a:r>
-              <a:rPr lang="en-GB" sz="1679" dirty="0" smtClean="0">
-                <a:solidFill>
-                  <a:srgbClr val="032044"/>
-                </a:solidFill>
-              </a:rPr>
-              <a:t> </a:t>
-            </a:r>
-            <a:endParaRPr sz="1040" dirty="0">
-              <a:solidFill>
-                <a:srgbClr val="032044"/>
-              </a:solidFill>
-            </a:endParaRPr>
-          </a:p>
-          <a:p>
-            <a:pPr marL="0" lvl="0" indent="0" rtl="0">
-              <a:lnSpc>
-                <a:spcPct val="80000"/>
-              </a:lnSpc>
-              <a:spcBef>
-                <a:spcPts val="304"/>
-              </a:spcBef>
-              <a:spcAft>
-                <a:spcPts val="0"/>
-              </a:spcAft>
-              <a:buNone/>
-            </a:pPr>
-            <a:r>
-              <a:rPr lang="en-GB" sz="1800" dirty="0" smtClean="0">
-                <a:solidFill>
-                  <a:srgbClr val="032044"/>
-                </a:solidFill>
-                <a:latin typeface="Courier New"/>
-                <a:ea typeface="Courier New"/>
-                <a:cs typeface="Courier New"/>
-                <a:sym typeface="Courier New"/>
-              </a:rPr>
-              <a:t>  $ </a:t>
-            </a:r>
-            <a:r>
-              <a:rPr lang="en-GB" sz="1800" b="1" dirty="0" err="1">
-                <a:solidFill>
-                  <a:srgbClr val="032044"/>
-                </a:solidFill>
-                <a:latin typeface="Courier New"/>
-                <a:ea typeface="Courier New"/>
-                <a:cs typeface="Courier New"/>
-                <a:sym typeface="Courier New"/>
-              </a:rPr>
-              <a:t>bjobs</a:t>
-            </a:r>
-            <a:endParaRPr sz="1800" b="1" dirty="0">
-              <a:solidFill>
-                <a:srgbClr val="032044"/>
-              </a:solidFill>
-              <a:latin typeface="Courier New"/>
-              <a:ea typeface="Courier New"/>
-              <a:cs typeface="Courier New"/>
-              <a:sym typeface="Courier New"/>
-            </a:endParaRPr>
-          </a:p>
-          <a:p>
-            <a:pPr marL="0" lvl="0" indent="0" rtl="0">
-              <a:lnSpc>
-                <a:spcPct val="80000"/>
-              </a:lnSpc>
-              <a:spcBef>
-                <a:spcPts val="264"/>
-              </a:spcBef>
-              <a:spcAft>
-                <a:spcPts val="0"/>
-              </a:spcAft>
-              <a:buClr>
-                <a:srgbClr val="032044"/>
-              </a:buClr>
-              <a:buSzPts val="1320"/>
-              <a:buFont typeface="Arial"/>
-              <a:buNone/>
-            </a:pPr>
-            <a:r>
-              <a:rPr lang="en-GB" sz="1400" dirty="0" smtClean="0">
-                <a:solidFill>
-                  <a:srgbClr val="032044"/>
-                </a:solidFill>
-                <a:latin typeface="Courier New"/>
-                <a:ea typeface="Courier New"/>
-                <a:cs typeface="Courier New"/>
-                <a:sym typeface="Courier New"/>
-              </a:rPr>
-              <a:t>  JOBID     </a:t>
-            </a:r>
-            <a:r>
-              <a:rPr lang="en-GB" sz="1400" dirty="0">
-                <a:solidFill>
-                  <a:srgbClr val="032044"/>
-                </a:solidFill>
-                <a:latin typeface="Courier New"/>
-                <a:ea typeface="Courier New"/>
-                <a:cs typeface="Courier New"/>
-                <a:sym typeface="Courier New"/>
-              </a:rPr>
-              <a:t>USER  </a:t>
-            </a:r>
-            <a:r>
-              <a:rPr lang="en-GB" sz="1400" dirty="0" smtClean="0">
-                <a:solidFill>
-                  <a:srgbClr val="032044"/>
-                </a:solidFill>
-                <a:latin typeface="Courier New"/>
-                <a:ea typeface="Courier New"/>
-                <a:cs typeface="Courier New"/>
-                <a:sym typeface="Courier New"/>
-              </a:rPr>
-              <a:t>STAT  </a:t>
-            </a:r>
-            <a:r>
-              <a:rPr lang="en-GB" sz="1400" dirty="0">
-                <a:solidFill>
-                  <a:srgbClr val="032044"/>
-                </a:solidFill>
-                <a:latin typeface="Courier New"/>
-                <a:ea typeface="Courier New"/>
-                <a:cs typeface="Courier New"/>
-                <a:sym typeface="Courier New"/>
-              </a:rPr>
-              <a:t>QUEUE      </a:t>
-            </a:r>
-            <a:r>
-              <a:rPr lang="en-GB" sz="1400" dirty="0" smtClean="0">
-                <a:solidFill>
-                  <a:srgbClr val="032044"/>
-                </a:solidFill>
-                <a:latin typeface="Courier New"/>
-                <a:ea typeface="Courier New"/>
-                <a:cs typeface="Courier New"/>
-                <a:sym typeface="Courier New"/>
-              </a:rPr>
-              <a:t>  FROM_HOST    </a:t>
-            </a:r>
-            <a:r>
-              <a:rPr lang="en-GB" sz="1400" dirty="0">
-                <a:solidFill>
-                  <a:srgbClr val="032044"/>
-                </a:solidFill>
-                <a:latin typeface="Courier New"/>
-                <a:ea typeface="Courier New"/>
-                <a:cs typeface="Courier New"/>
-                <a:sym typeface="Courier New"/>
-              </a:rPr>
-              <a:t>EXEC_HOST </a:t>
-            </a:r>
-            <a:r>
-              <a:rPr lang="en-GB" sz="1400" dirty="0" smtClean="0">
-                <a:solidFill>
-                  <a:srgbClr val="032044"/>
-                </a:solidFill>
-                <a:latin typeface="Courier New"/>
-                <a:ea typeface="Courier New"/>
-                <a:cs typeface="Courier New"/>
-                <a:sym typeface="Courier New"/>
-              </a:rPr>
-              <a:t>  JOB_NAME SUBMIT_TIME</a:t>
-            </a:r>
-            <a:endParaRPr lang="en-GB" sz="1400" dirty="0">
-              <a:solidFill>
-                <a:srgbClr val="032044"/>
-              </a:solidFill>
-              <a:ea typeface="Courier New"/>
-            </a:endParaRPr>
-          </a:p>
-          <a:p>
-            <a:pPr marL="0" lvl="0" indent="0" rtl="0">
-              <a:lnSpc>
-                <a:spcPct val="80000"/>
-              </a:lnSpc>
-              <a:spcBef>
-                <a:spcPts val="264"/>
-              </a:spcBef>
-              <a:spcAft>
-                <a:spcPts val="0"/>
-              </a:spcAft>
-              <a:buClr>
-                <a:srgbClr val="032044"/>
-              </a:buClr>
-              <a:buSzPts val="1320"/>
-              <a:buFont typeface="Arial"/>
-              <a:buNone/>
-            </a:pPr>
-            <a:r>
-              <a:rPr lang="en-GB" sz="1400" dirty="0" smtClean="0">
-                <a:solidFill>
-                  <a:srgbClr val="032044"/>
-                </a:solidFill>
-                <a:latin typeface="Courier New"/>
-                <a:ea typeface="Courier New"/>
-                <a:cs typeface="Courier New"/>
-                <a:sym typeface="Courier New"/>
-              </a:rPr>
-              <a:t>  6485340   </a:t>
-            </a:r>
-            <a:r>
-              <a:rPr lang="en-GB" sz="1400" dirty="0" err="1">
-                <a:solidFill>
-                  <a:srgbClr val="032044"/>
-                </a:solidFill>
-                <a:latin typeface="Courier New"/>
-                <a:ea typeface="Courier New"/>
-                <a:cs typeface="Courier New"/>
-                <a:sym typeface="Courier New"/>
-              </a:rPr>
-              <a:t>msmiz</a:t>
-            </a:r>
-            <a:r>
-              <a:rPr lang="en-GB" sz="1400" dirty="0">
-                <a:solidFill>
-                  <a:srgbClr val="032044"/>
-                </a:solidFill>
-                <a:latin typeface="Courier New"/>
-                <a:ea typeface="Courier New"/>
-                <a:cs typeface="Courier New"/>
-                <a:sym typeface="Courier New"/>
-              </a:rPr>
-              <a:t> </a:t>
-            </a:r>
-            <a:r>
-              <a:rPr lang="en-GB" sz="1400" dirty="0" smtClean="0">
-                <a:solidFill>
-                  <a:srgbClr val="032044"/>
-                </a:solidFill>
-                <a:latin typeface="Courier New"/>
-                <a:ea typeface="Courier New"/>
-                <a:cs typeface="Courier New"/>
-                <a:sym typeface="Courier New"/>
-              </a:rPr>
-              <a:t> RUN  </a:t>
-            </a:r>
-            <a:r>
-              <a:rPr lang="en-GB" sz="1400" dirty="0">
-                <a:solidFill>
-                  <a:srgbClr val="032044"/>
-                </a:solidFill>
-                <a:latin typeface="Courier New"/>
-                <a:ea typeface="Courier New"/>
-                <a:cs typeface="Courier New"/>
-                <a:sym typeface="Courier New"/>
-              </a:rPr>
-              <a:t>short-serial jasmin-sci1 </a:t>
-            </a:r>
-            <a:r>
-              <a:rPr lang="en-GB" sz="1400" dirty="0" smtClean="0">
-                <a:solidFill>
-                  <a:srgbClr val="032044"/>
-                </a:solidFill>
-                <a:latin typeface="Courier New"/>
-                <a:ea typeface="Courier New"/>
-                <a:cs typeface="Courier New"/>
-                <a:sym typeface="Courier New"/>
-              </a:rPr>
-              <a:t> host177.jc</a:t>
-            </a:r>
-            <a:r>
-              <a:rPr lang="en-GB" sz="1400" dirty="0">
-                <a:solidFill>
-                  <a:srgbClr val="032044"/>
-                </a:solidFill>
-                <a:latin typeface="Courier New"/>
-                <a:ea typeface="Courier New"/>
-                <a:cs typeface="Courier New"/>
-                <a:sym typeface="Courier New"/>
-              </a:rPr>
-              <a:t>. Myjob1  </a:t>
-            </a:r>
-            <a:r>
-              <a:rPr lang="en-GB" sz="1400" dirty="0" smtClean="0">
-                <a:solidFill>
-                  <a:srgbClr val="032044"/>
-                </a:solidFill>
-                <a:latin typeface="Courier New"/>
-                <a:ea typeface="Courier New"/>
-                <a:cs typeface="Courier New"/>
-                <a:sym typeface="Courier New"/>
-              </a:rPr>
-              <a:t> Jul </a:t>
-            </a:r>
-            <a:r>
-              <a:rPr lang="en-GB" sz="1400" dirty="0">
-                <a:solidFill>
-                  <a:srgbClr val="032044"/>
-                </a:solidFill>
-                <a:latin typeface="Courier New"/>
-                <a:ea typeface="Courier New"/>
-                <a:cs typeface="Courier New"/>
-                <a:sym typeface="Courier New"/>
-              </a:rPr>
-              <a:t>21 11:46</a:t>
-            </a:r>
-            <a:endParaRPr sz="1400" dirty="0">
-              <a:solidFill>
-                <a:srgbClr val="032044"/>
-              </a:solidFill>
-            </a:endParaRPr>
-          </a:p>
-          <a:p>
-            <a:pPr marL="0" lvl="0" indent="0" rtl="0">
-              <a:lnSpc>
-                <a:spcPct val="80000"/>
-              </a:lnSpc>
-              <a:spcBef>
-                <a:spcPts val="264"/>
-              </a:spcBef>
-              <a:spcAft>
-                <a:spcPts val="0"/>
-              </a:spcAft>
-              <a:buClr>
-                <a:srgbClr val="032044"/>
-              </a:buClr>
-              <a:buSzPts val="1320"/>
-              <a:buFont typeface="Arial"/>
-              <a:buNone/>
-            </a:pPr>
-            <a:r>
-              <a:rPr lang="en-GB" sz="1400" dirty="0" smtClean="0">
-                <a:solidFill>
-                  <a:srgbClr val="032044"/>
-                </a:solidFill>
-                <a:latin typeface="Courier New"/>
-                <a:ea typeface="Courier New"/>
-                <a:cs typeface="Courier New"/>
-                <a:sym typeface="Courier New"/>
-              </a:rPr>
-              <a:t>  6485346   </a:t>
-            </a:r>
-            <a:r>
-              <a:rPr lang="en-GB" sz="1400" dirty="0" err="1">
-                <a:solidFill>
-                  <a:srgbClr val="032044"/>
-                </a:solidFill>
-                <a:latin typeface="Courier New"/>
-                <a:ea typeface="Courier New"/>
-                <a:cs typeface="Courier New"/>
-                <a:sym typeface="Courier New"/>
-              </a:rPr>
-              <a:t>msmiz</a:t>
-            </a:r>
-            <a:r>
-              <a:rPr lang="en-GB" sz="1400" dirty="0">
-                <a:solidFill>
-                  <a:srgbClr val="032044"/>
-                </a:solidFill>
-                <a:latin typeface="Courier New"/>
-                <a:ea typeface="Courier New"/>
-                <a:cs typeface="Courier New"/>
-                <a:sym typeface="Courier New"/>
-              </a:rPr>
-              <a:t> </a:t>
-            </a:r>
-            <a:r>
-              <a:rPr lang="en-GB" sz="1400" dirty="0" smtClean="0">
-                <a:solidFill>
-                  <a:srgbClr val="032044"/>
-                </a:solidFill>
-                <a:latin typeface="Courier New"/>
-                <a:ea typeface="Courier New"/>
-                <a:cs typeface="Courier New"/>
-                <a:sym typeface="Courier New"/>
-              </a:rPr>
-              <a:t> RUN  </a:t>
-            </a:r>
-            <a:r>
-              <a:rPr lang="en-GB" sz="1400" dirty="0">
-                <a:solidFill>
-                  <a:srgbClr val="032044"/>
-                </a:solidFill>
-                <a:latin typeface="Courier New"/>
-                <a:ea typeface="Courier New"/>
-                <a:cs typeface="Courier New"/>
-                <a:sym typeface="Courier New"/>
-              </a:rPr>
-              <a:t>short-serial jasmin-sci1 </a:t>
-            </a:r>
-            <a:r>
-              <a:rPr lang="en-GB" sz="1400" dirty="0" smtClean="0">
-                <a:solidFill>
-                  <a:srgbClr val="032044"/>
-                </a:solidFill>
-                <a:latin typeface="Courier New"/>
-                <a:ea typeface="Courier New"/>
-                <a:cs typeface="Courier New"/>
-                <a:sym typeface="Courier New"/>
-              </a:rPr>
-              <a:t> host232.jc</a:t>
-            </a:r>
-            <a:r>
-              <a:rPr lang="en-GB" sz="1400" dirty="0">
-                <a:solidFill>
-                  <a:srgbClr val="032044"/>
-                </a:solidFill>
-                <a:latin typeface="Courier New"/>
-                <a:ea typeface="Courier New"/>
-                <a:cs typeface="Courier New"/>
-                <a:sym typeface="Courier New"/>
-              </a:rPr>
-              <a:t>. Myjob2  </a:t>
-            </a:r>
-            <a:r>
-              <a:rPr lang="en-GB" sz="1400" dirty="0" smtClean="0">
-                <a:solidFill>
-                  <a:srgbClr val="032044"/>
-                </a:solidFill>
-                <a:latin typeface="Courier New"/>
-                <a:ea typeface="Courier New"/>
-                <a:cs typeface="Courier New"/>
-                <a:sym typeface="Courier New"/>
-              </a:rPr>
-              <a:t> Jul </a:t>
-            </a:r>
-            <a:r>
-              <a:rPr lang="en-GB" sz="1400" dirty="0">
-                <a:solidFill>
-                  <a:srgbClr val="032044"/>
-                </a:solidFill>
-                <a:latin typeface="Courier New"/>
-                <a:ea typeface="Courier New"/>
-                <a:cs typeface="Courier New"/>
-                <a:sym typeface="Courier New"/>
-              </a:rPr>
-              <a:t>21 </a:t>
-            </a:r>
-            <a:r>
-              <a:rPr lang="en-GB" sz="1400" dirty="0" smtClean="0">
-                <a:solidFill>
-                  <a:srgbClr val="032044"/>
-                </a:solidFill>
-                <a:latin typeface="Courier New"/>
-                <a:ea typeface="Courier New"/>
-                <a:cs typeface="Courier New"/>
-                <a:sym typeface="Courier New"/>
-              </a:rPr>
-              <a:t>11:46</a:t>
-            </a:r>
-          </a:p>
-          <a:p>
-            <a:pPr marL="0" lvl="0" indent="0" rtl="0">
-              <a:lnSpc>
-                <a:spcPct val="80000"/>
-              </a:lnSpc>
-              <a:spcBef>
-                <a:spcPts val="264"/>
-              </a:spcBef>
-              <a:spcAft>
-                <a:spcPts val="0"/>
-              </a:spcAft>
-              <a:buClr>
-                <a:srgbClr val="032044"/>
-              </a:buClr>
-              <a:buSzPts val="1320"/>
-              <a:buFont typeface="Arial"/>
-              <a:buNone/>
-            </a:pPr>
-            <a:endParaRPr sz="800" dirty="0">
-              <a:solidFill>
-                <a:srgbClr val="000000"/>
-              </a:solidFill>
-            </a:endParaRPr>
-          </a:p>
-          <a:p>
-            <a:pPr marL="0" lvl="0" indent="0" algn="l" rtl="0">
-              <a:lnSpc>
-                <a:spcPct val="90000"/>
-              </a:lnSpc>
-              <a:spcBef>
-                <a:spcPts val="1000"/>
-              </a:spcBef>
-              <a:spcAft>
-                <a:spcPts val="0"/>
-              </a:spcAft>
-              <a:buClr>
-                <a:srgbClr val="000000"/>
-              </a:buClr>
-              <a:buSzPts val="2800"/>
-              <a:buFont typeface="Arial"/>
-              <a:buNone/>
-            </a:pPr>
-            <a:r>
-              <a:rPr lang="en-GB" b="1" dirty="0">
-                <a:solidFill>
-                  <a:srgbClr val="000000"/>
-                </a:solidFill>
-              </a:rPr>
-              <a:t>Cancel a job: </a:t>
-            </a:r>
-            <a:r>
-              <a:rPr lang="en-GB" b="1" dirty="0" err="1">
-                <a:solidFill>
-                  <a:srgbClr val="032044"/>
-                </a:solidFill>
-                <a:latin typeface="Courier New"/>
-                <a:ea typeface="Courier New"/>
-                <a:cs typeface="Courier New"/>
-                <a:sym typeface="Courier New"/>
-              </a:rPr>
-              <a:t>bkill</a:t>
-            </a:r>
-            <a:r>
-              <a:rPr lang="en-GB" b="1" dirty="0">
-                <a:solidFill>
-                  <a:srgbClr val="032044"/>
-                </a:solidFill>
-                <a:latin typeface="Courier New"/>
-                <a:ea typeface="Courier New"/>
-                <a:cs typeface="Courier New"/>
-                <a:sym typeface="Courier New"/>
-              </a:rPr>
-              <a:t> &lt;</a:t>
-            </a:r>
-            <a:r>
-              <a:rPr lang="en-GB" b="1" dirty="0" err="1">
-                <a:solidFill>
-                  <a:srgbClr val="032044"/>
-                </a:solidFill>
-                <a:latin typeface="Courier New"/>
-                <a:ea typeface="Courier New"/>
-                <a:cs typeface="Courier New"/>
-                <a:sym typeface="Courier New"/>
-              </a:rPr>
-              <a:t>job_id</a:t>
-            </a:r>
-            <a:r>
-              <a:rPr lang="en-GB" b="1" dirty="0">
-                <a:solidFill>
-                  <a:srgbClr val="032044"/>
-                </a:solidFill>
-                <a:latin typeface="Courier New"/>
-                <a:ea typeface="Courier New"/>
-                <a:cs typeface="Courier New"/>
-                <a:sym typeface="Courier New"/>
-              </a:rPr>
-              <a:t>&gt; </a:t>
-            </a:r>
-            <a:endParaRPr sz="2800" b="1" dirty="0">
-              <a:solidFill>
-                <a:srgbClr val="000000"/>
-              </a:solidFill>
-            </a:endParaRPr>
-          </a:p>
-          <a:p>
-            <a:pPr marL="0" lvl="0" indent="0" algn="l" rtl="0">
-              <a:lnSpc>
-                <a:spcPct val="100000"/>
-              </a:lnSpc>
-              <a:spcBef>
-                <a:spcPts val="360"/>
-              </a:spcBef>
-              <a:spcAft>
-                <a:spcPts val="0"/>
-              </a:spcAft>
-              <a:buClr>
-                <a:schemeClr val="dk1"/>
-              </a:buClr>
-              <a:buSzPts val="1100"/>
-              <a:buFont typeface="Arial"/>
-              <a:buNone/>
-            </a:pPr>
-            <a:r>
-              <a:rPr lang="en-GB" sz="1400" dirty="0" smtClean="0">
-                <a:latin typeface="Courier New"/>
-                <a:ea typeface="Courier New"/>
-                <a:cs typeface="Courier New"/>
-                <a:sym typeface="Courier New"/>
-              </a:rPr>
-              <a:t>   </a:t>
-            </a:r>
-            <a:r>
-              <a:rPr lang="en-GB" sz="1800" dirty="0" smtClean="0">
-                <a:latin typeface="Courier New"/>
-                <a:ea typeface="Courier New"/>
-                <a:cs typeface="Courier New"/>
-                <a:sym typeface="Courier New"/>
-              </a:rPr>
-              <a:t>$ </a:t>
-            </a:r>
-            <a:r>
-              <a:rPr lang="en-GB" sz="1800" b="1" dirty="0" err="1">
-                <a:latin typeface="Courier New"/>
-                <a:ea typeface="Courier New"/>
-                <a:cs typeface="Courier New"/>
-                <a:sym typeface="Courier New"/>
-              </a:rPr>
-              <a:t>bkill</a:t>
-            </a:r>
-            <a:r>
-              <a:rPr lang="en-GB" sz="1800" b="1" dirty="0">
-                <a:latin typeface="Courier New"/>
-                <a:ea typeface="Courier New"/>
-                <a:cs typeface="Courier New"/>
-                <a:sym typeface="Courier New"/>
-              </a:rPr>
-              <a:t> </a:t>
-            </a:r>
-            <a:r>
-              <a:rPr lang="en-GB" sz="1800" b="1" dirty="0">
-                <a:solidFill>
-                  <a:srgbClr val="032044"/>
-                </a:solidFill>
-                <a:latin typeface="Courier New"/>
-                <a:ea typeface="Courier New"/>
-                <a:cs typeface="Courier New"/>
-                <a:sym typeface="Courier New"/>
-              </a:rPr>
-              <a:t>6485346</a:t>
-            </a:r>
-            <a:endParaRPr sz="1800" b="1" dirty="0">
-              <a:latin typeface="Courier New"/>
-              <a:ea typeface="Courier New"/>
-              <a:cs typeface="Courier New"/>
-              <a:sym typeface="Courier New"/>
-            </a:endParaRPr>
-          </a:p>
-          <a:p>
-            <a:pPr marL="0" lvl="0" indent="0" algn="l" rtl="0">
-              <a:lnSpc>
-                <a:spcPct val="100000"/>
-              </a:lnSpc>
-              <a:spcBef>
-                <a:spcPts val="360"/>
-              </a:spcBef>
-              <a:spcAft>
-                <a:spcPts val="0"/>
-              </a:spcAft>
-              <a:buClr>
-                <a:schemeClr val="dk1"/>
-              </a:buClr>
-              <a:buSzPts val="1100"/>
-              <a:buFont typeface="Arial"/>
-              <a:buNone/>
-            </a:pPr>
-            <a:r>
-              <a:rPr lang="en-GB" sz="1800" dirty="0" smtClean="0">
-                <a:latin typeface="Courier New"/>
-                <a:ea typeface="Courier New"/>
-                <a:cs typeface="Courier New"/>
-                <a:sym typeface="Courier New"/>
-              </a:rPr>
-              <a:t>   Job </a:t>
-            </a:r>
-            <a:r>
-              <a:rPr lang="en-GB" sz="1800" dirty="0">
-                <a:latin typeface="Courier New"/>
-                <a:ea typeface="Courier New"/>
-                <a:cs typeface="Courier New"/>
-                <a:sym typeface="Courier New"/>
-              </a:rPr>
-              <a:t>&lt;</a:t>
-            </a:r>
-            <a:r>
-              <a:rPr lang="en-GB" sz="1800" dirty="0">
-                <a:solidFill>
-                  <a:srgbClr val="032044"/>
-                </a:solidFill>
-                <a:latin typeface="Courier New"/>
-                <a:ea typeface="Courier New"/>
-                <a:cs typeface="Courier New"/>
-                <a:sym typeface="Courier New"/>
-              </a:rPr>
-              <a:t>6485346</a:t>
-            </a:r>
-            <a:r>
-              <a:rPr lang="en-GB" sz="1800" dirty="0">
-                <a:latin typeface="Courier New"/>
-                <a:ea typeface="Courier New"/>
-                <a:cs typeface="Courier New"/>
-                <a:sym typeface="Courier New"/>
-              </a:rPr>
-              <a:t>&gt; is being killed</a:t>
-            </a:r>
-            <a:endParaRPr sz="1800" dirty="0">
-              <a:latin typeface="Courier New"/>
-              <a:ea typeface="Courier New"/>
-              <a:cs typeface="Courier New"/>
-              <a:sym typeface="Courier New"/>
-            </a:endParaRPr>
-          </a:p>
-          <a:p>
-            <a:pPr marL="228600" lvl="0" indent="-228600" algn="l" rtl="0">
-              <a:lnSpc>
-                <a:spcPct val="90000"/>
-              </a:lnSpc>
-              <a:spcBef>
-                <a:spcPts val="1000"/>
-              </a:spcBef>
-              <a:spcAft>
-                <a:spcPts val="0"/>
-              </a:spcAft>
-              <a:buClr>
-                <a:schemeClr val="dk1"/>
-              </a:buClr>
-              <a:buSzPts val="800"/>
-              <a:buFont typeface="Arial"/>
-              <a:buNone/>
-            </a:pPr>
-            <a:endParaRPr sz="800" b="1" dirty="0"/>
-          </a:p>
-          <a:p>
-            <a:pPr marL="228600" lvl="0" indent="-228600" algn="ctr" rtl="0">
-              <a:lnSpc>
-                <a:spcPct val="90000"/>
-              </a:lnSpc>
-              <a:spcBef>
-                <a:spcPts val="1000"/>
-              </a:spcBef>
-              <a:spcAft>
-                <a:spcPts val="0"/>
-              </a:spcAft>
-              <a:buClr>
-                <a:schemeClr val="dk1"/>
-              </a:buClr>
-              <a:buSzPts val="2800"/>
-              <a:buFont typeface="Arial"/>
-              <a:buNone/>
-            </a:pPr>
-            <a:endParaRPr sz="2800" b="1" dirty="0"/>
-          </a:p>
-          <a:p>
-            <a:pPr marL="228600" lvl="0" indent="-228600" algn="l" rtl="0">
-              <a:lnSpc>
-                <a:spcPct val="90000"/>
-              </a:lnSpc>
-              <a:spcBef>
-                <a:spcPts val="1000"/>
-              </a:spcBef>
-              <a:spcAft>
-                <a:spcPts val="0"/>
-              </a:spcAft>
-              <a:buClr>
-                <a:schemeClr val="dk1"/>
-              </a:buClr>
-              <a:buSzPts val="2400"/>
-              <a:buFont typeface="Arial"/>
-              <a:buNone/>
-            </a:pPr>
-            <a:endParaRPr dirty="0"/>
-          </a:p>
-        </p:txBody>
-      </p:sp>
-      <p:sp>
-        <p:nvSpPr>
-          <p:cNvPr id="2" name="Rectangle 1"/>
-          <p:cNvSpPr/>
-          <p:nvPr/>
-        </p:nvSpPr>
-        <p:spPr>
-          <a:xfrm>
-            <a:off x="138545" y="3726870"/>
-            <a:ext cx="8894619" cy="1094510"/>
-          </a:xfrm>
-          <a:prstGeom prst="rect">
-            <a:avLst/>
-          </a:prstGeom>
-          <a:noFill/>
-          <a:ln w="19050">
-            <a:solidFill>
-              <a:schemeClr val="tx1"/>
-            </a:solidFill>
-          </a:ln>
-        </p:spPr>
-        <p:style>
-          <a:lnRef idx="2">
-            <a:schemeClr val="accent1">
-              <a:shade val="50000"/>
-            </a:schemeClr>
-          </a:lnRef>
-          <a:fillRef idx="1">
-            <a:schemeClr val="accent1"/>
-          </a:fillRef>
-          <a:effectRef idx="0">
-            <a:schemeClr val="accent1"/>
-          </a:effectRef>
-          <a:fontRef idx="minor">
-            <a:schemeClr val="lt1"/>
-          </a:fontRef>
-        </p:style>
-        <p:txBody>
-          <a:bodyPr rtlCol="0" anchor="ctr"/>
-          <a:lstStyle/>
-          <a:p>
-            <a:pPr algn="ctr"/>
-            <a:endParaRPr lang="en-GB"/>
-          </a:p>
-        </p:txBody>
-      </p:sp>
-      <p:sp>
-        <p:nvSpPr>
-          <p:cNvPr id="5" name="Rectangle 4"/>
-          <p:cNvSpPr/>
-          <p:nvPr/>
-        </p:nvSpPr>
-        <p:spPr>
-          <a:xfrm>
-            <a:off x="138545" y="5306290"/>
-            <a:ext cx="8894619" cy="723312"/>
-          </a:xfrm>
-          <a:prstGeom prst="rect">
-            <a:avLst/>
-          </a:prstGeom>
-          <a:noFill/>
-          <a:ln w="19050">
-            <a:solidFill>
-              <a:schemeClr val="tx1"/>
-            </a:solidFill>
-          </a:ln>
-        </p:spPr>
-        <p:style>
-          <a:lnRef idx="2">
-            <a:schemeClr val="accent1">
-              <a:shade val="50000"/>
-            </a:schemeClr>
-          </a:lnRef>
-          <a:fillRef idx="1">
-            <a:schemeClr val="accent1"/>
-          </a:fillRef>
-          <a:effectRef idx="0">
-            <a:schemeClr val="accent1"/>
-          </a:effectRef>
-          <a:fontRef idx="minor">
-            <a:schemeClr val="lt1"/>
-          </a:fontRef>
-        </p:style>
-        <p:txBody>
-          <a:bodyPr rtlCol="0" anchor="ctr"/>
-          <a:lstStyle/>
-          <a:p>
-            <a:pPr algn="ctr"/>
-            <a:endParaRPr lang="en-GB"/>
-          </a:p>
-        </p:txBody>
-      </p:sp>
-      <p:sp>
-        <p:nvSpPr>
-          <p:cNvPr id="6" name="Rectangle 5"/>
-          <p:cNvSpPr/>
-          <p:nvPr/>
-        </p:nvSpPr>
-        <p:spPr>
-          <a:xfrm>
-            <a:off x="138545" y="2285998"/>
-            <a:ext cx="8894619" cy="900543"/>
-          </a:xfrm>
-          <a:prstGeom prst="rect">
-            <a:avLst/>
-          </a:prstGeom>
-          <a:noFill/>
-          <a:ln w="19050">
-            <a:solidFill>
-              <a:schemeClr val="tx1"/>
-            </a:solidFill>
-          </a:ln>
-        </p:spPr>
-        <p:style>
-          <a:lnRef idx="2">
-            <a:schemeClr val="accent1">
-              <a:shade val="50000"/>
-            </a:schemeClr>
-          </a:lnRef>
-          <a:fillRef idx="1">
-            <a:schemeClr val="accent1"/>
-          </a:fillRef>
-          <a:effectRef idx="0">
-            <a:schemeClr val="accent1"/>
-          </a:effectRef>
-          <a:fontRef idx="minor">
-            <a:schemeClr val="lt1"/>
-          </a:fontRef>
-        </p:style>
-        <p:txBody>
-          <a:bodyPr rtlCol="0" anchor="ctr"/>
-          <a:lstStyle/>
-          <a:p>
-            <a:pPr algn="ctr"/>
-            <a:endParaRPr lang="en-GB"/>
           </a:p>
         </p:txBody>
       </p:sp>
@@ -18165,6 +16927,1570 @@
 </file>
 
 <file path=ppt/slides/slide20.xml><?xml version="1.0" encoding="utf-8"?>
+<p:sld xmlns:a="http://schemas.openxmlformats.org/drawingml/2006/main" xmlns:r="http://schemas.openxmlformats.org/officeDocument/2006/relationships" xmlns:p="http://schemas.openxmlformats.org/presentationml/2006/main">
+  <p:cSld>
+    <p:spTree>
+      <p:nvGrpSpPr>
+        <p:cNvPr id="1" name="Shape 308"/>
+        <p:cNvGrpSpPr/>
+        <p:nvPr/>
+      </p:nvGrpSpPr>
+      <p:grpSpPr>
+        <a:xfrm>
+          <a:off x="0" y="0"/>
+          <a:ext cx="0" cy="0"/>
+          <a:chOff x="0" y="0"/>
+          <a:chExt cx="0" cy="0"/>
+        </a:xfrm>
+      </p:grpSpPr>
+      <p:sp>
+        <p:nvSpPr>
+          <p:cNvPr id="309" name="Google Shape;309;p42"/>
+          <p:cNvSpPr txBox="1">
+            <a:spLocks noGrp="1"/>
+          </p:cNvSpPr>
+          <p:nvPr>
+            <p:ph type="title"/>
+          </p:nvPr>
+        </p:nvSpPr>
+        <p:spPr>
+          <a:xfrm>
+            <a:off x="457200" y="122238"/>
+            <a:ext cx="8229600" cy="562200"/>
+          </a:xfrm>
+          <a:prstGeom prst="rect">
+            <a:avLst/>
+          </a:prstGeom>
+          <a:noFill/>
+          <a:ln>
+            <a:noFill/>
+          </a:ln>
+        </p:spPr>
+        <p:txBody>
+          <a:bodyPr spcFirstLastPara="1" wrap="square" lIns="91425" tIns="45700" rIns="91425" bIns="45700" anchor="ctr" anchorCtr="0">
+            <a:noAutofit/>
+          </a:bodyPr>
+          <a:lstStyle/>
+          <a:p>
+            <a:pPr marL="0" lvl="0" indent="0" algn="ctr" rtl="0">
+              <a:lnSpc>
+                <a:spcPct val="90000"/>
+              </a:lnSpc>
+              <a:spcBef>
+                <a:spcPts val="0"/>
+              </a:spcBef>
+              <a:spcAft>
+                <a:spcPts val="0"/>
+              </a:spcAft>
+              <a:buClr>
+                <a:srgbClr val="000000"/>
+              </a:buClr>
+              <a:buSzPts val="3200"/>
+              <a:buFont typeface="Calibri"/>
+              <a:buNone/>
+            </a:pPr>
+            <a:r>
+              <a:rPr lang="en-GB" sz="3200" b="1" dirty="0" smtClean="0">
+                <a:latin typeface="Arial Rounded MT Bold" panose="020F0704030504030204" pitchFamily="34" charset="0"/>
+              </a:rPr>
+              <a:t>LSF Scheduler comm</a:t>
+            </a:r>
+            <a:r>
+              <a:rPr lang="en-GB" sz="3200" b="1" dirty="0" smtClean="0"/>
+              <a:t>ands</a:t>
+            </a:r>
+            <a:endParaRPr sz="3200" b="1" dirty="0"/>
+          </a:p>
+        </p:txBody>
+      </p:sp>
+      <p:sp>
+        <p:nvSpPr>
+          <p:cNvPr id="310" name="Google Shape;310;p42"/>
+          <p:cNvSpPr txBox="1">
+            <a:spLocks noGrp="1"/>
+          </p:cNvSpPr>
+          <p:nvPr>
+            <p:ph type="body" idx="1"/>
+          </p:nvPr>
+        </p:nvSpPr>
+        <p:spPr>
+          <a:xfrm>
+            <a:off x="0" y="745292"/>
+            <a:ext cx="9033164" cy="5256600"/>
+          </a:xfrm>
+          <a:prstGeom prst="rect">
+            <a:avLst/>
+          </a:prstGeom>
+          <a:noFill/>
+          <a:ln>
+            <a:noFill/>
+          </a:ln>
+        </p:spPr>
+        <p:txBody>
+          <a:bodyPr spcFirstLastPara="1" wrap="square" lIns="91425" tIns="45700" rIns="91425" bIns="45700" anchor="t" anchorCtr="0">
+            <a:noAutofit/>
+          </a:bodyPr>
+          <a:lstStyle/>
+          <a:p>
+            <a:pPr marL="228600" lvl="0" indent="-228600" algn="l" rtl="0">
+              <a:lnSpc>
+                <a:spcPct val="90000"/>
+              </a:lnSpc>
+              <a:spcBef>
+                <a:spcPts val="0"/>
+              </a:spcBef>
+              <a:spcAft>
+                <a:spcPts val="0"/>
+              </a:spcAft>
+              <a:buClr>
+                <a:srgbClr val="000000"/>
+              </a:buClr>
+              <a:buSzPts val="2800"/>
+              <a:buFont typeface="Arial"/>
+              <a:buNone/>
+            </a:pPr>
+            <a:r>
+              <a:rPr lang="en-GB" b="1" dirty="0" smtClean="0">
+                <a:solidFill>
+                  <a:srgbClr val="000000"/>
+                </a:solidFill>
+              </a:rPr>
+              <a:t>To interact with the LOTUS LSF scheduler first login to one of:</a:t>
+            </a:r>
+          </a:p>
+          <a:p>
+            <a:pPr marL="342900" lvl="0" algn="l" rtl="0">
+              <a:lnSpc>
+                <a:spcPct val="90000"/>
+              </a:lnSpc>
+              <a:spcBef>
+                <a:spcPts val="0"/>
+              </a:spcBef>
+              <a:spcAft>
+                <a:spcPts val="0"/>
+              </a:spcAft>
+              <a:buClr>
+                <a:srgbClr val="000000"/>
+              </a:buClr>
+              <a:buSzPts val="2800"/>
+              <a:buFont typeface="Arial" panose="020B0604020202020204" pitchFamily="34" charset="0"/>
+              <a:buChar char="•"/>
+            </a:pPr>
+            <a:r>
+              <a:rPr lang="en-GB" dirty="0" smtClean="0">
+                <a:solidFill>
+                  <a:srgbClr val="000000"/>
+                </a:solidFill>
+              </a:rPr>
+              <a:t>JASMIN </a:t>
+            </a:r>
+            <a:r>
+              <a:rPr lang="en-GB" dirty="0">
+                <a:solidFill>
+                  <a:srgbClr val="000000"/>
+                </a:solidFill>
+              </a:rPr>
+              <a:t>scientific servers </a:t>
+            </a:r>
+            <a:r>
+              <a:rPr lang="en-GB" dirty="0" smtClean="0">
+                <a:solidFill>
+                  <a:srgbClr val="000000"/>
+                </a:solidFill>
+              </a:rPr>
+              <a:t>(</a:t>
+            </a:r>
+            <a:r>
+              <a:rPr lang="en-GB" dirty="0" err="1" smtClean="0">
+                <a:solidFill>
+                  <a:schemeClr val="tx1"/>
+                </a:solidFill>
+                <a:latin typeface="Calibri" panose="020F0502020204030204" pitchFamily="34" charset="0"/>
+                <a:ea typeface="Courier New"/>
+                <a:cs typeface="Calibri" panose="020F0502020204030204" pitchFamily="34" charset="0"/>
+                <a:sym typeface="Courier New"/>
+              </a:rPr>
+              <a:t>jasmin-sci</a:t>
+            </a:r>
+            <a:r>
+              <a:rPr lang="en-GB" b="1" dirty="0" smtClean="0">
+                <a:solidFill>
+                  <a:schemeClr val="tx1"/>
+                </a:solidFill>
+                <a:latin typeface="Calibri" panose="020F0502020204030204" pitchFamily="34" charset="0"/>
+                <a:ea typeface="Courier New"/>
+                <a:cs typeface="Calibri" panose="020F0502020204030204" pitchFamily="34" charset="0"/>
+                <a:sym typeface="Courier New"/>
+              </a:rPr>
+              <a:t>[</a:t>
+            </a:r>
+            <a:r>
+              <a:rPr lang="en-GB" dirty="0" smtClean="0">
+                <a:solidFill>
+                  <a:schemeClr val="tx1"/>
+                </a:solidFill>
+                <a:latin typeface="Calibri" panose="020F0502020204030204" pitchFamily="34" charset="0"/>
+                <a:ea typeface="Courier New"/>
+                <a:cs typeface="Calibri" panose="020F0502020204030204" pitchFamily="34" charset="0"/>
+                <a:sym typeface="Courier New"/>
+              </a:rPr>
+              <a:t>1-5</a:t>
+            </a:r>
+            <a:r>
+              <a:rPr lang="en-GB" b="1" dirty="0">
+                <a:solidFill>
+                  <a:schemeClr val="tx1"/>
+                </a:solidFill>
+                <a:latin typeface="Calibri" panose="020F0502020204030204" pitchFamily="34" charset="0"/>
+                <a:ea typeface="Courier New"/>
+                <a:cs typeface="Calibri" panose="020F0502020204030204" pitchFamily="34" charset="0"/>
+                <a:sym typeface="Courier New"/>
+              </a:rPr>
+              <a:t>]</a:t>
+            </a:r>
+            <a:r>
+              <a:rPr lang="en-GB" dirty="0">
+                <a:solidFill>
+                  <a:schemeClr val="tx1"/>
+                </a:solidFill>
+                <a:latin typeface="Calibri" panose="020F0502020204030204" pitchFamily="34" charset="0"/>
+                <a:ea typeface="Courier New"/>
+                <a:cs typeface="Calibri" panose="020F0502020204030204" pitchFamily="34" charset="0"/>
+                <a:sym typeface="Courier New"/>
+              </a:rPr>
+              <a:t>.</a:t>
+            </a:r>
+            <a:r>
+              <a:rPr lang="en-GB" dirty="0" smtClean="0">
+                <a:solidFill>
+                  <a:schemeClr val="tx1"/>
+                </a:solidFill>
+                <a:latin typeface="Calibri" panose="020F0502020204030204" pitchFamily="34" charset="0"/>
+                <a:ea typeface="Courier New"/>
+                <a:cs typeface="Calibri" panose="020F0502020204030204" pitchFamily="34" charset="0"/>
+                <a:sym typeface="Courier New"/>
+              </a:rPr>
+              <a:t>ceda.ac.uk)</a:t>
+            </a:r>
+          </a:p>
+          <a:p>
+            <a:pPr marL="342900" lvl="0" algn="l" rtl="0">
+              <a:lnSpc>
+                <a:spcPct val="90000"/>
+              </a:lnSpc>
+              <a:spcBef>
+                <a:spcPts val="0"/>
+              </a:spcBef>
+              <a:spcAft>
+                <a:spcPts val="0"/>
+              </a:spcAft>
+              <a:buClr>
+                <a:srgbClr val="000000"/>
+              </a:buClr>
+              <a:buSzPts val="2800"/>
+              <a:buFont typeface="Arial" panose="020B0604020202020204" pitchFamily="34" charset="0"/>
+              <a:buChar char="•"/>
+            </a:pPr>
+            <a:r>
+              <a:rPr lang="en-GB" dirty="0" smtClean="0">
+                <a:solidFill>
+                  <a:srgbClr val="000000"/>
+                </a:solidFill>
+              </a:rPr>
+              <a:t>LOTUS </a:t>
+            </a:r>
+            <a:r>
+              <a:rPr lang="en-GB" dirty="0">
+                <a:solidFill>
+                  <a:srgbClr val="000000"/>
+                </a:solidFill>
+              </a:rPr>
+              <a:t>head </a:t>
+            </a:r>
+            <a:r>
+              <a:rPr lang="en-GB" dirty="0" smtClean="0">
+                <a:solidFill>
+                  <a:srgbClr val="000000"/>
+                </a:solidFill>
+              </a:rPr>
+              <a:t>node</a:t>
+            </a:r>
+            <a:r>
+              <a:rPr lang="en-GB" dirty="0">
+                <a:solidFill>
+                  <a:srgbClr val="000000"/>
+                </a:solidFill>
+              </a:rPr>
+              <a:t> </a:t>
+            </a:r>
+            <a:r>
+              <a:rPr lang="en-GB" dirty="0" smtClean="0">
+                <a:solidFill>
+                  <a:srgbClr val="000000"/>
+                </a:solidFill>
+              </a:rPr>
+              <a:t>(</a:t>
+            </a:r>
+            <a:r>
+              <a:rPr lang="en-GB" dirty="0" smtClean="0">
+                <a:solidFill>
+                  <a:schemeClr val="tx1"/>
+                </a:solidFill>
+                <a:latin typeface="Calibri" panose="020F0502020204030204" pitchFamily="34" charset="0"/>
+                <a:cs typeface="Calibri" panose="020F0502020204030204" pitchFamily="34" charset="0"/>
+              </a:rPr>
+              <a:t>l</a:t>
+            </a:r>
+            <a:r>
+              <a:rPr lang="en-GB" dirty="0" smtClean="0">
+                <a:solidFill>
+                  <a:schemeClr val="tx1"/>
+                </a:solidFill>
+                <a:latin typeface="Calibri" panose="020F0502020204030204" pitchFamily="34" charset="0"/>
+                <a:ea typeface="Courier New"/>
+                <a:cs typeface="Calibri" panose="020F0502020204030204" pitchFamily="34" charset="0"/>
+                <a:sym typeface="Courier New"/>
+              </a:rPr>
+              <a:t>otus.jc.rl.ac.uk</a:t>
+            </a:r>
+            <a:r>
+              <a:rPr lang="en-GB" dirty="0" smtClean="0">
+                <a:solidFill>
+                  <a:schemeClr val="tx1"/>
+                </a:solidFill>
+                <a:latin typeface="Courier New"/>
+                <a:ea typeface="Courier New"/>
+                <a:cs typeface="Courier New"/>
+                <a:sym typeface="Courier New"/>
+              </a:rPr>
+              <a:t>)</a:t>
+            </a:r>
+            <a:endParaRPr dirty="0"/>
+          </a:p>
+          <a:p>
+            <a:pPr marL="228600" lvl="0" indent="-228600" algn="l" rtl="0">
+              <a:lnSpc>
+                <a:spcPct val="90000"/>
+              </a:lnSpc>
+              <a:spcBef>
+                <a:spcPts val="1000"/>
+              </a:spcBef>
+              <a:spcAft>
+                <a:spcPts val="0"/>
+              </a:spcAft>
+              <a:buClr>
+                <a:srgbClr val="000000"/>
+              </a:buClr>
+              <a:buSzPts val="2400"/>
+              <a:buFont typeface="Arial"/>
+              <a:buNone/>
+            </a:pPr>
+            <a:r>
+              <a:rPr lang="en-GB" b="1" dirty="0" smtClean="0"/>
+              <a:t>Job submission: </a:t>
+            </a:r>
+            <a:r>
+              <a:rPr lang="en-GB" b="1" dirty="0" err="1" smtClean="0">
+                <a:latin typeface="Courier New" panose="02070309020205020404" pitchFamily="49" charset="0"/>
+                <a:cs typeface="Courier New" panose="02070309020205020404" pitchFamily="49" charset="0"/>
+              </a:rPr>
+              <a:t>bsub</a:t>
+            </a:r>
+            <a:r>
+              <a:rPr lang="en-GB" b="1" dirty="0" smtClean="0">
+                <a:latin typeface="Courier New" panose="02070309020205020404" pitchFamily="49" charset="0"/>
+                <a:cs typeface="Courier New" panose="02070309020205020404" pitchFamily="49" charset="0"/>
+              </a:rPr>
+              <a:t> &lt;options&gt; command</a:t>
+            </a:r>
+            <a:endParaRPr lang="en-GB" sz="1000" b="1" dirty="0">
+              <a:latin typeface="Courier New" panose="02070309020205020404" pitchFamily="49" charset="0"/>
+              <a:cs typeface="Courier New" panose="02070309020205020404" pitchFamily="49" charset="0"/>
+            </a:endParaRPr>
+          </a:p>
+          <a:p>
+            <a:pPr marL="228600" lvl="0" indent="-228600" algn="l" rtl="0">
+              <a:lnSpc>
+                <a:spcPct val="90000"/>
+              </a:lnSpc>
+              <a:spcBef>
+                <a:spcPts val="1000"/>
+              </a:spcBef>
+              <a:spcAft>
+                <a:spcPts val="0"/>
+              </a:spcAft>
+              <a:buClr>
+                <a:srgbClr val="000000"/>
+              </a:buClr>
+              <a:buSzPts val="2400"/>
+              <a:buFont typeface="Arial"/>
+              <a:buNone/>
+            </a:pPr>
+            <a:endParaRPr sz="800" b="1" dirty="0">
+              <a:latin typeface="Courier New" panose="02070309020205020404" pitchFamily="49" charset="0"/>
+              <a:cs typeface="Courier New" panose="02070309020205020404" pitchFamily="49" charset="0"/>
+            </a:endParaRPr>
+          </a:p>
+          <a:p>
+            <a:pPr marL="0" lvl="0" indent="0" rtl="0">
+              <a:lnSpc>
+                <a:spcPct val="80000"/>
+              </a:lnSpc>
+              <a:spcBef>
+                <a:spcPts val="304"/>
+              </a:spcBef>
+              <a:spcAft>
+                <a:spcPts val="0"/>
+              </a:spcAft>
+              <a:buClr>
+                <a:schemeClr val="dk1"/>
+              </a:buClr>
+              <a:buSzPts val="1100"/>
+              <a:buFont typeface="Arial"/>
+              <a:buNone/>
+            </a:pPr>
+            <a:r>
+              <a:rPr lang="en-GB" sz="2000" dirty="0" smtClean="0">
+                <a:solidFill>
+                  <a:srgbClr val="032044"/>
+                </a:solidFill>
+                <a:latin typeface="Courier"/>
+                <a:ea typeface="Courier New"/>
+                <a:cs typeface="Courier New"/>
+                <a:sym typeface="Courier New"/>
+              </a:rPr>
+              <a:t>  </a:t>
+            </a:r>
+            <a:r>
+              <a:rPr lang="en-GB" sz="1800" dirty="0" smtClean="0">
+                <a:solidFill>
+                  <a:srgbClr val="032044"/>
+                </a:solidFill>
+                <a:latin typeface="Courier"/>
+                <a:ea typeface="Courier New"/>
+                <a:cs typeface="Courier New"/>
+                <a:sym typeface="Courier New"/>
+              </a:rPr>
+              <a:t>$ </a:t>
+            </a:r>
+            <a:r>
+              <a:rPr lang="en-GB" sz="1800" b="1" dirty="0" err="1">
+                <a:solidFill>
+                  <a:srgbClr val="032044"/>
+                </a:solidFill>
+                <a:latin typeface="Courier New" panose="02070309020205020404" pitchFamily="49" charset="0"/>
+                <a:ea typeface="Courier New"/>
+                <a:cs typeface="Courier New" panose="02070309020205020404" pitchFamily="49" charset="0"/>
+                <a:sym typeface="Courier New"/>
+              </a:rPr>
+              <a:t>bsub</a:t>
+            </a:r>
+            <a:r>
+              <a:rPr lang="en-GB" sz="1800" dirty="0">
+                <a:solidFill>
+                  <a:srgbClr val="032044"/>
+                </a:solidFill>
+                <a:latin typeface="Courier New" panose="02070309020205020404" pitchFamily="49" charset="0"/>
+                <a:ea typeface="Courier New"/>
+                <a:cs typeface="Courier New" panose="02070309020205020404" pitchFamily="49" charset="0"/>
+                <a:sym typeface="Courier New"/>
+              </a:rPr>
+              <a:t> -o %</a:t>
+            </a:r>
+            <a:r>
+              <a:rPr lang="en-GB" sz="1800" dirty="0" err="1">
+                <a:solidFill>
+                  <a:srgbClr val="032044"/>
+                </a:solidFill>
+                <a:latin typeface="Courier New" panose="02070309020205020404" pitchFamily="49" charset="0"/>
+                <a:ea typeface="Courier New"/>
+                <a:cs typeface="Courier New" panose="02070309020205020404" pitchFamily="49" charset="0"/>
+                <a:sym typeface="Courier New"/>
+              </a:rPr>
+              <a:t>J.out</a:t>
+            </a:r>
+            <a:r>
+              <a:rPr lang="en-GB" sz="1800" dirty="0">
+                <a:solidFill>
+                  <a:srgbClr val="032044"/>
+                </a:solidFill>
+                <a:latin typeface="Courier New" panose="02070309020205020404" pitchFamily="49" charset="0"/>
+                <a:ea typeface="Courier New"/>
+                <a:cs typeface="Courier New" panose="02070309020205020404" pitchFamily="49" charset="0"/>
+                <a:sym typeface="Courier New"/>
+              </a:rPr>
+              <a:t> -W 00:10 python2.7 </a:t>
+            </a:r>
+            <a:r>
+              <a:rPr lang="en-GB" sz="1800" b="1" dirty="0" smtClean="0">
+                <a:solidFill>
+                  <a:srgbClr val="032044"/>
+                </a:solidFill>
+                <a:latin typeface="Courier New" panose="02070309020205020404" pitchFamily="49" charset="0"/>
+                <a:ea typeface="Courier New"/>
+                <a:cs typeface="Courier New" panose="02070309020205020404" pitchFamily="49" charset="0"/>
+                <a:sym typeface="Courier New"/>
+              </a:rPr>
+              <a:t>mypythonscript.py</a:t>
+            </a:r>
+            <a:endParaRPr sz="1800" b="1" dirty="0">
+              <a:solidFill>
+                <a:srgbClr val="032044"/>
+              </a:solidFill>
+              <a:latin typeface="Courier New" panose="02070309020205020404" pitchFamily="49" charset="0"/>
+              <a:ea typeface="Courier New"/>
+              <a:cs typeface="Courier New" panose="02070309020205020404" pitchFamily="49" charset="0"/>
+              <a:sym typeface="Courier New"/>
+            </a:endParaRPr>
+          </a:p>
+          <a:p>
+            <a:pPr marL="0" lvl="0" indent="0" rtl="0">
+              <a:lnSpc>
+                <a:spcPct val="80000"/>
+              </a:lnSpc>
+              <a:spcBef>
+                <a:spcPts val="304"/>
+              </a:spcBef>
+              <a:spcAft>
+                <a:spcPts val="0"/>
+              </a:spcAft>
+              <a:buClr>
+                <a:schemeClr val="dk1"/>
+              </a:buClr>
+              <a:buSzPts val="1100"/>
+              <a:buFont typeface="Arial"/>
+              <a:buNone/>
+            </a:pPr>
+            <a:r>
+              <a:rPr lang="en-GB" sz="1800" dirty="0" smtClean="0">
+                <a:solidFill>
+                  <a:srgbClr val="032044"/>
+                </a:solidFill>
+                <a:latin typeface="Courier New" panose="02070309020205020404" pitchFamily="49" charset="0"/>
+                <a:ea typeface="Courier New"/>
+                <a:cs typeface="Courier New" panose="02070309020205020404" pitchFamily="49" charset="0"/>
+                <a:sym typeface="Courier New"/>
+              </a:rPr>
+              <a:t>  Job </a:t>
+            </a:r>
+            <a:r>
+              <a:rPr lang="en-GB" sz="1800" dirty="0">
+                <a:solidFill>
+                  <a:srgbClr val="032044"/>
+                </a:solidFill>
+                <a:latin typeface="Courier New" panose="02070309020205020404" pitchFamily="49" charset="0"/>
+                <a:ea typeface="Courier New"/>
+                <a:cs typeface="Courier New" panose="02070309020205020404" pitchFamily="49" charset="0"/>
+                <a:sym typeface="Courier New"/>
+              </a:rPr>
+              <a:t>&lt;6485340&gt; is submitted to default queue &lt;short-serial&gt;.</a:t>
+            </a:r>
+            <a:endParaRPr sz="1800" dirty="0">
+              <a:solidFill>
+                <a:srgbClr val="032044"/>
+              </a:solidFill>
+              <a:latin typeface="Courier New" panose="02070309020205020404" pitchFamily="49" charset="0"/>
+              <a:ea typeface="Courier New"/>
+              <a:cs typeface="Courier New" panose="02070309020205020404" pitchFamily="49" charset="0"/>
+              <a:sym typeface="Courier New"/>
+            </a:endParaRPr>
+          </a:p>
+          <a:p>
+            <a:pPr marL="228600" lvl="0" indent="-228600" algn="l" rtl="0">
+              <a:lnSpc>
+                <a:spcPct val="90000"/>
+              </a:lnSpc>
+              <a:spcBef>
+                <a:spcPts val="1000"/>
+              </a:spcBef>
+              <a:spcAft>
+                <a:spcPts val="0"/>
+              </a:spcAft>
+              <a:buClr>
+                <a:schemeClr val="dk1"/>
+              </a:buClr>
+              <a:buSzPts val="800"/>
+              <a:buFont typeface="Arial"/>
+              <a:buNone/>
+            </a:pPr>
+            <a:endParaRPr sz="800" dirty="0">
+              <a:solidFill>
+                <a:srgbClr val="000000"/>
+              </a:solidFill>
+              <a:latin typeface="Courier"/>
+            </a:endParaRPr>
+          </a:p>
+          <a:p>
+            <a:pPr marL="0" lvl="0" indent="0" algn="l" rtl="0">
+              <a:lnSpc>
+                <a:spcPct val="80000"/>
+              </a:lnSpc>
+              <a:spcBef>
+                <a:spcPts val="0"/>
+              </a:spcBef>
+              <a:spcAft>
+                <a:spcPts val="0"/>
+              </a:spcAft>
+              <a:buClr>
+                <a:srgbClr val="032044"/>
+              </a:buClr>
+              <a:buSzPts val="2400"/>
+              <a:buFont typeface="Arial"/>
+              <a:buNone/>
+            </a:pPr>
+            <a:r>
+              <a:rPr lang="en-GB" b="1" dirty="0">
+                <a:solidFill>
+                  <a:srgbClr val="032044"/>
+                </a:solidFill>
+              </a:rPr>
+              <a:t>Job information:</a:t>
+            </a:r>
+            <a:r>
+              <a:rPr lang="en-GB" sz="1520" b="1" dirty="0">
+                <a:solidFill>
+                  <a:srgbClr val="032044"/>
+                </a:solidFill>
+                <a:latin typeface="Courier New"/>
+                <a:ea typeface="Courier New"/>
+                <a:cs typeface="Courier New"/>
+                <a:sym typeface="Courier New"/>
+              </a:rPr>
+              <a:t> </a:t>
+            </a:r>
+            <a:r>
+              <a:rPr lang="en-GB" b="1" dirty="0" err="1">
+                <a:solidFill>
+                  <a:srgbClr val="032044"/>
+                </a:solidFill>
+                <a:latin typeface="Courier New"/>
+                <a:ea typeface="Courier New"/>
+                <a:cs typeface="Courier New"/>
+                <a:sym typeface="Courier New"/>
+              </a:rPr>
+              <a:t>bjobs</a:t>
+            </a:r>
+            <a:endParaRPr b="1" dirty="0">
+              <a:solidFill>
+                <a:srgbClr val="032044"/>
+              </a:solidFill>
+            </a:endParaRPr>
+          </a:p>
+          <a:p>
+            <a:pPr marL="0" lvl="0" indent="0" algn="l" rtl="0">
+              <a:lnSpc>
+                <a:spcPct val="80000"/>
+              </a:lnSpc>
+              <a:spcBef>
+                <a:spcPts val="400"/>
+              </a:spcBef>
+              <a:spcAft>
+                <a:spcPts val="0"/>
+              </a:spcAft>
+              <a:buClr>
+                <a:srgbClr val="032044"/>
+              </a:buClr>
+              <a:buSzPts val="2000"/>
+              <a:buNone/>
+            </a:pPr>
+            <a:r>
+              <a:rPr lang="en-GB" sz="1679" dirty="0" smtClean="0">
+                <a:solidFill>
+                  <a:srgbClr val="032044"/>
+                </a:solidFill>
+              </a:rPr>
+              <a:t> </a:t>
+            </a:r>
+            <a:endParaRPr sz="1040" dirty="0">
+              <a:solidFill>
+                <a:srgbClr val="032044"/>
+              </a:solidFill>
+            </a:endParaRPr>
+          </a:p>
+          <a:p>
+            <a:pPr marL="0" lvl="0" indent="0" rtl="0">
+              <a:lnSpc>
+                <a:spcPct val="80000"/>
+              </a:lnSpc>
+              <a:spcBef>
+                <a:spcPts val="304"/>
+              </a:spcBef>
+              <a:spcAft>
+                <a:spcPts val="0"/>
+              </a:spcAft>
+              <a:buNone/>
+            </a:pPr>
+            <a:r>
+              <a:rPr lang="en-GB" sz="1800" dirty="0" smtClean="0">
+                <a:solidFill>
+                  <a:srgbClr val="032044"/>
+                </a:solidFill>
+                <a:latin typeface="Courier New"/>
+                <a:ea typeface="Courier New"/>
+                <a:cs typeface="Courier New"/>
+                <a:sym typeface="Courier New"/>
+              </a:rPr>
+              <a:t>  $ </a:t>
+            </a:r>
+            <a:r>
+              <a:rPr lang="en-GB" sz="1800" b="1" dirty="0" err="1">
+                <a:solidFill>
+                  <a:srgbClr val="032044"/>
+                </a:solidFill>
+                <a:latin typeface="Courier New"/>
+                <a:ea typeface="Courier New"/>
+                <a:cs typeface="Courier New"/>
+                <a:sym typeface="Courier New"/>
+              </a:rPr>
+              <a:t>bjobs</a:t>
+            </a:r>
+            <a:endParaRPr sz="1800" b="1" dirty="0">
+              <a:solidFill>
+                <a:srgbClr val="032044"/>
+              </a:solidFill>
+              <a:latin typeface="Courier New"/>
+              <a:ea typeface="Courier New"/>
+              <a:cs typeface="Courier New"/>
+              <a:sym typeface="Courier New"/>
+            </a:endParaRPr>
+          </a:p>
+          <a:p>
+            <a:pPr marL="0" lvl="0" indent="0" rtl="0">
+              <a:lnSpc>
+                <a:spcPct val="80000"/>
+              </a:lnSpc>
+              <a:spcBef>
+                <a:spcPts val="264"/>
+              </a:spcBef>
+              <a:spcAft>
+                <a:spcPts val="0"/>
+              </a:spcAft>
+              <a:buClr>
+                <a:srgbClr val="032044"/>
+              </a:buClr>
+              <a:buSzPts val="1320"/>
+              <a:buFont typeface="Arial"/>
+              <a:buNone/>
+            </a:pPr>
+            <a:r>
+              <a:rPr lang="en-GB" sz="1400" dirty="0" smtClean="0">
+                <a:solidFill>
+                  <a:srgbClr val="032044"/>
+                </a:solidFill>
+                <a:latin typeface="Courier New"/>
+                <a:ea typeface="Courier New"/>
+                <a:cs typeface="Courier New"/>
+                <a:sym typeface="Courier New"/>
+              </a:rPr>
+              <a:t>  JOBID     </a:t>
+            </a:r>
+            <a:r>
+              <a:rPr lang="en-GB" sz="1400" dirty="0">
+                <a:solidFill>
+                  <a:srgbClr val="032044"/>
+                </a:solidFill>
+                <a:latin typeface="Courier New"/>
+                <a:ea typeface="Courier New"/>
+                <a:cs typeface="Courier New"/>
+                <a:sym typeface="Courier New"/>
+              </a:rPr>
+              <a:t>USER  </a:t>
+            </a:r>
+            <a:r>
+              <a:rPr lang="en-GB" sz="1400" dirty="0" smtClean="0">
+                <a:solidFill>
+                  <a:srgbClr val="032044"/>
+                </a:solidFill>
+                <a:latin typeface="Courier New"/>
+                <a:ea typeface="Courier New"/>
+                <a:cs typeface="Courier New"/>
+                <a:sym typeface="Courier New"/>
+              </a:rPr>
+              <a:t>STAT  </a:t>
+            </a:r>
+            <a:r>
+              <a:rPr lang="en-GB" sz="1400" dirty="0">
+                <a:solidFill>
+                  <a:srgbClr val="032044"/>
+                </a:solidFill>
+                <a:latin typeface="Courier New"/>
+                <a:ea typeface="Courier New"/>
+                <a:cs typeface="Courier New"/>
+                <a:sym typeface="Courier New"/>
+              </a:rPr>
+              <a:t>QUEUE      </a:t>
+            </a:r>
+            <a:r>
+              <a:rPr lang="en-GB" sz="1400" dirty="0" smtClean="0">
+                <a:solidFill>
+                  <a:srgbClr val="032044"/>
+                </a:solidFill>
+                <a:latin typeface="Courier New"/>
+                <a:ea typeface="Courier New"/>
+                <a:cs typeface="Courier New"/>
+                <a:sym typeface="Courier New"/>
+              </a:rPr>
+              <a:t>  FROM_HOST    </a:t>
+            </a:r>
+            <a:r>
+              <a:rPr lang="en-GB" sz="1400" dirty="0">
+                <a:solidFill>
+                  <a:srgbClr val="032044"/>
+                </a:solidFill>
+                <a:latin typeface="Courier New"/>
+                <a:ea typeface="Courier New"/>
+                <a:cs typeface="Courier New"/>
+                <a:sym typeface="Courier New"/>
+              </a:rPr>
+              <a:t>EXEC_HOST </a:t>
+            </a:r>
+            <a:r>
+              <a:rPr lang="en-GB" sz="1400" dirty="0" smtClean="0">
+                <a:solidFill>
+                  <a:srgbClr val="032044"/>
+                </a:solidFill>
+                <a:latin typeface="Courier New"/>
+                <a:ea typeface="Courier New"/>
+                <a:cs typeface="Courier New"/>
+                <a:sym typeface="Courier New"/>
+              </a:rPr>
+              <a:t>  JOB_NAME SUBMIT_TIME</a:t>
+            </a:r>
+            <a:endParaRPr lang="en-GB" sz="1400" dirty="0">
+              <a:solidFill>
+                <a:srgbClr val="032044"/>
+              </a:solidFill>
+              <a:ea typeface="Courier New"/>
+            </a:endParaRPr>
+          </a:p>
+          <a:p>
+            <a:pPr marL="0" lvl="0" indent="0" rtl="0">
+              <a:lnSpc>
+                <a:spcPct val="80000"/>
+              </a:lnSpc>
+              <a:spcBef>
+                <a:spcPts val="264"/>
+              </a:spcBef>
+              <a:spcAft>
+                <a:spcPts val="0"/>
+              </a:spcAft>
+              <a:buClr>
+                <a:srgbClr val="032044"/>
+              </a:buClr>
+              <a:buSzPts val="1320"/>
+              <a:buFont typeface="Arial"/>
+              <a:buNone/>
+            </a:pPr>
+            <a:r>
+              <a:rPr lang="en-GB" sz="1400" dirty="0" smtClean="0">
+                <a:solidFill>
+                  <a:srgbClr val="032044"/>
+                </a:solidFill>
+                <a:latin typeface="Courier New"/>
+                <a:ea typeface="Courier New"/>
+                <a:cs typeface="Courier New"/>
+                <a:sym typeface="Courier New"/>
+              </a:rPr>
+              <a:t>  6485340   </a:t>
+            </a:r>
+            <a:r>
+              <a:rPr lang="en-GB" sz="1400" dirty="0" err="1">
+                <a:solidFill>
+                  <a:srgbClr val="032044"/>
+                </a:solidFill>
+                <a:latin typeface="Courier New"/>
+                <a:ea typeface="Courier New"/>
+                <a:cs typeface="Courier New"/>
+                <a:sym typeface="Courier New"/>
+              </a:rPr>
+              <a:t>msmiz</a:t>
+            </a:r>
+            <a:r>
+              <a:rPr lang="en-GB" sz="1400" dirty="0">
+                <a:solidFill>
+                  <a:srgbClr val="032044"/>
+                </a:solidFill>
+                <a:latin typeface="Courier New"/>
+                <a:ea typeface="Courier New"/>
+                <a:cs typeface="Courier New"/>
+                <a:sym typeface="Courier New"/>
+              </a:rPr>
+              <a:t> </a:t>
+            </a:r>
+            <a:r>
+              <a:rPr lang="en-GB" sz="1400" dirty="0" smtClean="0">
+                <a:solidFill>
+                  <a:srgbClr val="032044"/>
+                </a:solidFill>
+                <a:latin typeface="Courier New"/>
+                <a:ea typeface="Courier New"/>
+                <a:cs typeface="Courier New"/>
+                <a:sym typeface="Courier New"/>
+              </a:rPr>
+              <a:t> RUN  </a:t>
+            </a:r>
+            <a:r>
+              <a:rPr lang="en-GB" sz="1400" dirty="0">
+                <a:solidFill>
+                  <a:srgbClr val="032044"/>
+                </a:solidFill>
+                <a:latin typeface="Courier New"/>
+                <a:ea typeface="Courier New"/>
+                <a:cs typeface="Courier New"/>
+                <a:sym typeface="Courier New"/>
+              </a:rPr>
+              <a:t>short-serial jasmin-sci1 </a:t>
+            </a:r>
+            <a:r>
+              <a:rPr lang="en-GB" sz="1400" dirty="0" smtClean="0">
+                <a:solidFill>
+                  <a:srgbClr val="032044"/>
+                </a:solidFill>
+                <a:latin typeface="Courier New"/>
+                <a:ea typeface="Courier New"/>
+                <a:cs typeface="Courier New"/>
+                <a:sym typeface="Courier New"/>
+              </a:rPr>
+              <a:t> host177.jc</a:t>
+            </a:r>
+            <a:r>
+              <a:rPr lang="en-GB" sz="1400" dirty="0">
+                <a:solidFill>
+                  <a:srgbClr val="032044"/>
+                </a:solidFill>
+                <a:latin typeface="Courier New"/>
+                <a:ea typeface="Courier New"/>
+                <a:cs typeface="Courier New"/>
+                <a:sym typeface="Courier New"/>
+              </a:rPr>
+              <a:t>. Myjob1  </a:t>
+            </a:r>
+            <a:r>
+              <a:rPr lang="en-GB" sz="1400" dirty="0" smtClean="0">
+                <a:solidFill>
+                  <a:srgbClr val="032044"/>
+                </a:solidFill>
+                <a:latin typeface="Courier New"/>
+                <a:ea typeface="Courier New"/>
+                <a:cs typeface="Courier New"/>
+                <a:sym typeface="Courier New"/>
+              </a:rPr>
+              <a:t> Jul </a:t>
+            </a:r>
+            <a:r>
+              <a:rPr lang="en-GB" sz="1400" dirty="0">
+                <a:solidFill>
+                  <a:srgbClr val="032044"/>
+                </a:solidFill>
+                <a:latin typeface="Courier New"/>
+                <a:ea typeface="Courier New"/>
+                <a:cs typeface="Courier New"/>
+                <a:sym typeface="Courier New"/>
+              </a:rPr>
+              <a:t>21 11:46</a:t>
+            </a:r>
+            <a:endParaRPr sz="1400" dirty="0">
+              <a:solidFill>
+                <a:srgbClr val="032044"/>
+              </a:solidFill>
+            </a:endParaRPr>
+          </a:p>
+          <a:p>
+            <a:pPr marL="0" lvl="0" indent="0" rtl="0">
+              <a:lnSpc>
+                <a:spcPct val="80000"/>
+              </a:lnSpc>
+              <a:spcBef>
+                <a:spcPts val="264"/>
+              </a:spcBef>
+              <a:spcAft>
+                <a:spcPts val="0"/>
+              </a:spcAft>
+              <a:buClr>
+                <a:srgbClr val="032044"/>
+              </a:buClr>
+              <a:buSzPts val="1320"/>
+              <a:buFont typeface="Arial"/>
+              <a:buNone/>
+            </a:pPr>
+            <a:r>
+              <a:rPr lang="en-GB" sz="1400" dirty="0" smtClean="0">
+                <a:solidFill>
+                  <a:srgbClr val="032044"/>
+                </a:solidFill>
+                <a:latin typeface="Courier New"/>
+                <a:ea typeface="Courier New"/>
+                <a:cs typeface="Courier New"/>
+                <a:sym typeface="Courier New"/>
+              </a:rPr>
+              <a:t>  6485346   </a:t>
+            </a:r>
+            <a:r>
+              <a:rPr lang="en-GB" sz="1400" dirty="0" err="1">
+                <a:solidFill>
+                  <a:srgbClr val="032044"/>
+                </a:solidFill>
+                <a:latin typeface="Courier New"/>
+                <a:ea typeface="Courier New"/>
+                <a:cs typeface="Courier New"/>
+                <a:sym typeface="Courier New"/>
+              </a:rPr>
+              <a:t>msmiz</a:t>
+            </a:r>
+            <a:r>
+              <a:rPr lang="en-GB" sz="1400" dirty="0">
+                <a:solidFill>
+                  <a:srgbClr val="032044"/>
+                </a:solidFill>
+                <a:latin typeface="Courier New"/>
+                <a:ea typeface="Courier New"/>
+                <a:cs typeface="Courier New"/>
+                <a:sym typeface="Courier New"/>
+              </a:rPr>
+              <a:t> </a:t>
+            </a:r>
+            <a:r>
+              <a:rPr lang="en-GB" sz="1400" dirty="0" smtClean="0">
+                <a:solidFill>
+                  <a:srgbClr val="032044"/>
+                </a:solidFill>
+                <a:latin typeface="Courier New"/>
+                <a:ea typeface="Courier New"/>
+                <a:cs typeface="Courier New"/>
+                <a:sym typeface="Courier New"/>
+              </a:rPr>
+              <a:t> RUN  </a:t>
+            </a:r>
+            <a:r>
+              <a:rPr lang="en-GB" sz="1400" dirty="0">
+                <a:solidFill>
+                  <a:srgbClr val="032044"/>
+                </a:solidFill>
+                <a:latin typeface="Courier New"/>
+                <a:ea typeface="Courier New"/>
+                <a:cs typeface="Courier New"/>
+                <a:sym typeface="Courier New"/>
+              </a:rPr>
+              <a:t>short-serial jasmin-sci1 </a:t>
+            </a:r>
+            <a:r>
+              <a:rPr lang="en-GB" sz="1400" dirty="0" smtClean="0">
+                <a:solidFill>
+                  <a:srgbClr val="032044"/>
+                </a:solidFill>
+                <a:latin typeface="Courier New"/>
+                <a:ea typeface="Courier New"/>
+                <a:cs typeface="Courier New"/>
+                <a:sym typeface="Courier New"/>
+              </a:rPr>
+              <a:t> host232.jc</a:t>
+            </a:r>
+            <a:r>
+              <a:rPr lang="en-GB" sz="1400" dirty="0">
+                <a:solidFill>
+                  <a:srgbClr val="032044"/>
+                </a:solidFill>
+                <a:latin typeface="Courier New"/>
+                <a:ea typeface="Courier New"/>
+                <a:cs typeface="Courier New"/>
+                <a:sym typeface="Courier New"/>
+              </a:rPr>
+              <a:t>. Myjob2  </a:t>
+            </a:r>
+            <a:r>
+              <a:rPr lang="en-GB" sz="1400" dirty="0" smtClean="0">
+                <a:solidFill>
+                  <a:srgbClr val="032044"/>
+                </a:solidFill>
+                <a:latin typeface="Courier New"/>
+                <a:ea typeface="Courier New"/>
+                <a:cs typeface="Courier New"/>
+                <a:sym typeface="Courier New"/>
+              </a:rPr>
+              <a:t> Jul </a:t>
+            </a:r>
+            <a:r>
+              <a:rPr lang="en-GB" sz="1400" dirty="0">
+                <a:solidFill>
+                  <a:srgbClr val="032044"/>
+                </a:solidFill>
+                <a:latin typeface="Courier New"/>
+                <a:ea typeface="Courier New"/>
+                <a:cs typeface="Courier New"/>
+                <a:sym typeface="Courier New"/>
+              </a:rPr>
+              <a:t>21 </a:t>
+            </a:r>
+            <a:r>
+              <a:rPr lang="en-GB" sz="1400" dirty="0" smtClean="0">
+                <a:solidFill>
+                  <a:srgbClr val="032044"/>
+                </a:solidFill>
+                <a:latin typeface="Courier New"/>
+                <a:ea typeface="Courier New"/>
+                <a:cs typeface="Courier New"/>
+                <a:sym typeface="Courier New"/>
+              </a:rPr>
+              <a:t>11:46</a:t>
+            </a:r>
+          </a:p>
+          <a:p>
+            <a:pPr marL="0" lvl="0" indent="0" rtl="0">
+              <a:lnSpc>
+                <a:spcPct val="80000"/>
+              </a:lnSpc>
+              <a:spcBef>
+                <a:spcPts val="264"/>
+              </a:spcBef>
+              <a:spcAft>
+                <a:spcPts val="0"/>
+              </a:spcAft>
+              <a:buClr>
+                <a:srgbClr val="032044"/>
+              </a:buClr>
+              <a:buSzPts val="1320"/>
+              <a:buFont typeface="Arial"/>
+              <a:buNone/>
+            </a:pPr>
+            <a:endParaRPr sz="800" dirty="0">
+              <a:solidFill>
+                <a:srgbClr val="000000"/>
+              </a:solidFill>
+            </a:endParaRPr>
+          </a:p>
+          <a:p>
+            <a:pPr marL="0" lvl="0" indent="0" algn="l" rtl="0">
+              <a:lnSpc>
+                <a:spcPct val="90000"/>
+              </a:lnSpc>
+              <a:spcBef>
+                <a:spcPts val="1000"/>
+              </a:spcBef>
+              <a:spcAft>
+                <a:spcPts val="0"/>
+              </a:spcAft>
+              <a:buClr>
+                <a:srgbClr val="000000"/>
+              </a:buClr>
+              <a:buSzPts val="2800"/>
+              <a:buFont typeface="Arial"/>
+              <a:buNone/>
+            </a:pPr>
+            <a:r>
+              <a:rPr lang="en-GB" b="1" dirty="0">
+                <a:solidFill>
+                  <a:srgbClr val="000000"/>
+                </a:solidFill>
+              </a:rPr>
+              <a:t>Cancel a job: </a:t>
+            </a:r>
+            <a:r>
+              <a:rPr lang="en-GB" b="1" dirty="0" err="1">
+                <a:solidFill>
+                  <a:srgbClr val="032044"/>
+                </a:solidFill>
+                <a:latin typeface="Courier New"/>
+                <a:ea typeface="Courier New"/>
+                <a:cs typeface="Courier New"/>
+                <a:sym typeface="Courier New"/>
+              </a:rPr>
+              <a:t>bkill</a:t>
+            </a:r>
+            <a:r>
+              <a:rPr lang="en-GB" b="1" dirty="0">
+                <a:solidFill>
+                  <a:srgbClr val="032044"/>
+                </a:solidFill>
+                <a:latin typeface="Courier New"/>
+                <a:ea typeface="Courier New"/>
+                <a:cs typeface="Courier New"/>
+                <a:sym typeface="Courier New"/>
+              </a:rPr>
+              <a:t> &lt;</a:t>
+            </a:r>
+            <a:r>
+              <a:rPr lang="en-GB" b="1" dirty="0" err="1">
+                <a:solidFill>
+                  <a:srgbClr val="032044"/>
+                </a:solidFill>
+                <a:latin typeface="Courier New"/>
+                <a:ea typeface="Courier New"/>
+                <a:cs typeface="Courier New"/>
+                <a:sym typeface="Courier New"/>
+              </a:rPr>
+              <a:t>job_id</a:t>
+            </a:r>
+            <a:r>
+              <a:rPr lang="en-GB" b="1" dirty="0">
+                <a:solidFill>
+                  <a:srgbClr val="032044"/>
+                </a:solidFill>
+                <a:latin typeface="Courier New"/>
+                <a:ea typeface="Courier New"/>
+                <a:cs typeface="Courier New"/>
+                <a:sym typeface="Courier New"/>
+              </a:rPr>
+              <a:t>&gt; </a:t>
+            </a:r>
+            <a:endParaRPr sz="2800" b="1" dirty="0">
+              <a:solidFill>
+                <a:srgbClr val="000000"/>
+              </a:solidFill>
+            </a:endParaRPr>
+          </a:p>
+          <a:p>
+            <a:pPr marL="0" lvl="0" indent="0" algn="l" rtl="0">
+              <a:lnSpc>
+                <a:spcPct val="100000"/>
+              </a:lnSpc>
+              <a:spcBef>
+                <a:spcPts val="360"/>
+              </a:spcBef>
+              <a:spcAft>
+                <a:spcPts val="0"/>
+              </a:spcAft>
+              <a:buClr>
+                <a:schemeClr val="dk1"/>
+              </a:buClr>
+              <a:buSzPts val="1100"/>
+              <a:buFont typeface="Arial"/>
+              <a:buNone/>
+            </a:pPr>
+            <a:r>
+              <a:rPr lang="en-GB" sz="1400" dirty="0" smtClean="0">
+                <a:latin typeface="Courier New"/>
+                <a:ea typeface="Courier New"/>
+                <a:cs typeface="Courier New"/>
+                <a:sym typeface="Courier New"/>
+              </a:rPr>
+              <a:t>   </a:t>
+            </a:r>
+            <a:r>
+              <a:rPr lang="en-GB" sz="1800" dirty="0" smtClean="0">
+                <a:latin typeface="Courier New"/>
+                <a:ea typeface="Courier New"/>
+                <a:cs typeface="Courier New"/>
+                <a:sym typeface="Courier New"/>
+              </a:rPr>
+              <a:t>$ </a:t>
+            </a:r>
+            <a:r>
+              <a:rPr lang="en-GB" sz="1800" b="1" dirty="0" err="1">
+                <a:latin typeface="Courier New"/>
+                <a:ea typeface="Courier New"/>
+                <a:cs typeface="Courier New"/>
+                <a:sym typeface="Courier New"/>
+              </a:rPr>
+              <a:t>bkill</a:t>
+            </a:r>
+            <a:r>
+              <a:rPr lang="en-GB" sz="1800" b="1" dirty="0">
+                <a:latin typeface="Courier New"/>
+                <a:ea typeface="Courier New"/>
+                <a:cs typeface="Courier New"/>
+                <a:sym typeface="Courier New"/>
+              </a:rPr>
+              <a:t> </a:t>
+            </a:r>
+            <a:r>
+              <a:rPr lang="en-GB" sz="1800" b="1" dirty="0">
+                <a:solidFill>
+                  <a:srgbClr val="032044"/>
+                </a:solidFill>
+                <a:latin typeface="Courier New"/>
+                <a:ea typeface="Courier New"/>
+                <a:cs typeface="Courier New"/>
+                <a:sym typeface="Courier New"/>
+              </a:rPr>
+              <a:t>6485346</a:t>
+            </a:r>
+            <a:endParaRPr sz="1800" b="1" dirty="0">
+              <a:latin typeface="Courier New"/>
+              <a:ea typeface="Courier New"/>
+              <a:cs typeface="Courier New"/>
+              <a:sym typeface="Courier New"/>
+            </a:endParaRPr>
+          </a:p>
+          <a:p>
+            <a:pPr marL="0" lvl="0" indent="0" algn="l" rtl="0">
+              <a:lnSpc>
+                <a:spcPct val="100000"/>
+              </a:lnSpc>
+              <a:spcBef>
+                <a:spcPts val="360"/>
+              </a:spcBef>
+              <a:spcAft>
+                <a:spcPts val="0"/>
+              </a:spcAft>
+              <a:buClr>
+                <a:schemeClr val="dk1"/>
+              </a:buClr>
+              <a:buSzPts val="1100"/>
+              <a:buFont typeface="Arial"/>
+              <a:buNone/>
+            </a:pPr>
+            <a:r>
+              <a:rPr lang="en-GB" sz="1800" dirty="0" smtClean="0">
+                <a:latin typeface="Courier New"/>
+                <a:ea typeface="Courier New"/>
+                <a:cs typeface="Courier New"/>
+                <a:sym typeface="Courier New"/>
+              </a:rPr>
+              <a:t>   Job </a:t>
+            </a:r>
+            <a:r>
+              <a:rPr lang="en-GB" sz="1800" dirty="0">
+                <a:latin typeface="Courier New"/>
+                <a:ea typeface="Courier New"/>
+                <a:cs typeface="Courier New"/>
+                <a:sym typeface="Courier New"/>
+              </a:rPr>
+              <a:t>&lt;</a:t>
+            </a:r>
+            <a:r>
+              <a:rPr lang="en-GB" sz="1800" dirty="0">
+                <a:solidFill>
+                  <a:srgbClr val="032044"/>
+                </a:solidFill>
+                <a:latin typeface="Courier New"/>
+                <a:ea typeface="Courier New"/>
+                <a:cs typeface="Courier New"/>
+                <a:sym typeface="Courier New"/>
+              </a:rPr>
+              <a:t>6485346</a:t>
+            </a:r>
+            <a:r>
+              <a:rPr lang="en-GB" sz="1800" dirty="0">
+                <a:latin typeface="Courier New"/>
+                <a:ea typeface="Courier New"/>
+                <a:cs typeface="Courier New"/>
+                <a:sym typeface="Courier New"/>
+              </a:rPr>
+              <a:t>&gt; is being killed</a:t>
+            </a:r>
+            <a:endParaRPr sz="1800" dirty="0">
+              <a:latin typeface="Courier New"/>
+              <a:ea typeface="Courier New"/>
+              <a:cs typeface="Courier New"/>
+              <a:sym typeface="Courier New"/>
+            </a:endParaRPr>
+          </a:p>
+          <a:p>
+            <a:pPr marL="228600" lvl="0" indent="-228600" algn="l" rtl="0">
+              <a:lnSpc>
+                <a:spcPct val="90000"/>
+              </a:lnSpc>
+              <a:spcBef>
+                <a:spcPts val="1000"/>
+              </a:spcBef>
+              <a:spcAft>
+                <a:spcPts val="0"/>
+              </a:spcAft>
+              <a:buClr>
+                <a:schemeClr val="dk1"/>
+              </a:buClr>
+              <a:buSzPts val="800"/>
+              <a:buFont typeface="Arial"/>
+              <a:buNone/>
+            </a:pPr>
+            <a:endParaRPr sz="800" b="1" dirty="0"/>
+          </a:p>
+          <a:p>
+            <a:pPr marL="228600" lvl="0" indent="-228600" algn="ctr" rtl="0">
+              <a:lnSpc>
+                <a:spcPct val="90000"/>
+              </a:lnSpc>
+              <a:spcBef>
+                <a:spcPts val="1000"/>
+              </a:spcBef>
+              <a:spcAft>
+                <a:spcPts val="0"/>
+              </a:spcAft>
+              <a:buClr>
+                <a:schemeClr val="dk1"/>
+              </a:buClr>
+              <a:buSzPts val="2800"/>
+              <a:buFont typeface="Arial"/>
+              <a:buNone/>
+            </a:pPr>
+            <a:endParaRPr sz="2800" b="1" dirty="0"/>
+          </a:p>
+          <a:p>
+            <a:pPr marL="228600" lvl="0" indent="-228600" algn="l" rtl="0">
+              <a:lnSpc>
+                <a:spcPct val="90000"/>
+              </a:lnSpc>
+              <a:spcBef>
+                <a:spcPts val="1000"/>
+              </a:spcBef>
+              <a:spcAft>
+                <a:spcPts val="0"/>
+              </a:spcAft>
+              <a:buClr>
+                <a:schemeClr val="dk1"/>
+              </a:buClr>
+              <a:buSzPts val="2400"/>
+              <a:buFont typeface="Arial"/>
+              <a:buNone/>
+            </a:pPr>
+            <a:endParaRPr dirty="0"/>
+          </a:p>
+        </p:txBody>
+      </p:sp>
+      <p:sp>
+        <p:nvSpPr>
+          <p:cNvPr id="2" name="Rectangle 1"/>
+          <p:cNvSpPr/>
+          <p:nvPr/>
+        </p:nvSpPr>
+        <p:spPr>
+          <a:xfrm>
+            <a:off x="138545" y="3726870"/>
+            <a:ext cx="8894619" cy="1094510"/>
+          </a:xfrm>
+          <a:prstGeom prst="rect">
+            <a:avLst/>
+          </a:prstGeom>
+          <a:noFill/>
+          <a:ln w="19050">
+            <a:solidFill>
+              <a:schemeClr val="tx1"/>
+            </a:solidFill>
+          </a:ln>
+        </p:spPr>
+        <p:style>
+          <a:lnRef idx="2">
+            <a:schemeClr val="accent1">
+              <a:shade val="50000"/>
+            </a:schemeClr>
+          </a:lnRef>
+          <a:fillRef idx="1">
+            <a:schemeClr val="accent1"/>
+          </a:fillRef>
+          <a:effectRef idx="0">
+            <a:schemeClr val="accent1"/>
+          </a:effectRef>
+          <a:fontRef idx="minor">
+            <a:schemeClr val="lt1"/>
+          </a:fontRef>
+        </p:style>
+        <p:txBody>
+          <a:bodyPr rtlCol="0" anchor="ctr"/>
+          <a:lstStyle/>
+          <a:p>
+            <a:pPr algn="ctr"/>
+            <a:endParaRPr lang="en-GB"/>
+          </a:p>
+        </p:txBody>
+      </p:sp>
+      <p:sp>
+        <p:nvSpPr>
+          <p:cNvPr id="5" name="Rectangle 4"/>
+          <p:cNvSpPr/>
+          <p:nvPr/>
+        </p:nvSpPr>
+        <p:spPr>
+          <a:xfrm>
+            <a:off x="138545" y="5306290"/>
+            <a:ext cx="8894619" cy="723312"/>
+          </a:xfrm>
+          <a:prstGeom prst="rect">
+            <a:avLst/>
+          </a:prstGeom>
+          <a:noFill/>
+          <a:ln w="19050">
+            <a:solidFill>
+              <a:schemeClr val="tx1"/>
+            </a:solidFill>
+          </a:ln>
+        </p:spPr>
+        <p:style>
+          <a:lnRef idx="2">
+            <a:schemeClr val="accent1">
+              <a:shade val="50000"/>
+            </a:schemeClr>
+          </a:lnRef>
+          <a:fillRef idx="1">
+            <a:schemeClr val="accent1"/>
+          </a:fillRef>
+          <a:effectRef idx="0">
+            <a:schemeClr val="accent1"/>
+          </a:effectRef>
+          <a:fontRef idx="minor">
+            <a:schemeClr val="lt1"/>
+          </a:fontRef>
+        </p:style>
+        <p:txBody>
+          <a:bodyPr rtlCol="0" anchor="ctr"/>
+          <a:lstStyle/>
+          <a:p>
+            <a:pPr algn="ctr"/>
+            <a:endParaRPr lang="en-GB"/>
+          </a:p>
+        </p:txBody>
+      </p:sp>
+      <p:sp>
+        <p:nvSpPr>
+          <p:cNvPr id="6" name="Rectangle 5"/>
+          <p:cNvSpPr/>
+          <p:nvPr/>
+        </p:nvSpPr>
+        <p:spPr>
+          <a:xfrm>
+            <a:off x="138545" y="2285998"/>
+            <a:ext cx="8894619" cy="900543"/>
+          </a:xfrm>
+          <a:prstGeom prst="rect">
+            <a:avLst/>
+          </a:prstGeom>
+          <a:noFill/>
+          <a:ln w="19050">
+            <a:solidFill>
+              <a:schemeClr val="tx1"/>
+            </a:solidFill>
+          </a:ln>
+        </p:spPr>
+        <p:style>
+          <a:lnRef idx="2">
+            <a:schemeClr val="accent1">
+              <a:shade val="50000"/>
+            </a:schemeClr>
+          </a:lnRef>
+          <a:fillRef idx="1">
+            <a:schemeClr val="accent1"/>
+          </a:fillRef>
+          <a:effectRef idx="0">
+            <a:schemeClr val="accent1"/>
+          </a:effectRef>
+          <a:fontRef idx="minor">
+            <a:schemeClr val="lt1"/>
+          </a:fontRef>
+        </p:style>
+        <p:txBody>
+          <a:bodyPr rtlCol="0" anchor="ctr"/>
+          <a:lstStyle/>
+          <a:p>
+            <a:pPr algn="ctr"/>
+            <a:endParaRPr lang="en-GB"/>
+          </a:p>
+        </p:txBody>
+      </p:sp>
+    </p:spTree>
+  </p:cSld>
+  <p:clrMapOvr>
+    <a:masterClrMapping/>
+  </p:clrMapOvr>
+  <p:timing>
+    <p:tnLst>
+      <p:par>
+        <p:cTn id="1" dur="indefinite" restart="never" nodeType="tmRoot"/>
+      </p:par>
+    </p:tnLst>
+  </p:timing>
+</p:sld>
+</file>
+
+<file path=ppt/slides/slide21.xml><?xml version="1.0" encoding="utf-8"?>
 <p:sld xmlns:a="http://schemas.openxmlformats.org/drawingml/2006/main" xmlns:r="http://schemas.openxmlformats.org/officeDocument/2006/relationships" xmlns:p="http://schemas.openxmlformats.org/presentationml/2006/main">
   <p:cSld>
     <p:spTree>
@@ -19475,7 +19801,7 @@
 </p:sld>
 </file>
 
-<file path=ppt/slides/slide21.xml><?xml version="1.0" encoding="utf-8"?>
+<file path=ppt/slides/slide22.xml><?xml version="1.0" encoding="utf-8"?>
 <p:sld xmlns:a="http://schemas.openxmlformats.org/drawingml/2006/main" xmlns:r="http://schemas.openxmlformats.org/officeDocument/2006/relationships" xmlns:p="http://schemas.openxmlformats.org/presentationml/2006/main" show="0">
   <p:cSld>
     <p:spTree>
@@ -19925,11 +20251,11 @@
   <p:clrMapOvr>
     <a:masterClrMapping/>
   </p:clrMapOvr>
-  <mc:AlternateContent xmlns:mc="http://schemas.openxmlformats.org/markup-compatibility/2006">
-    <mc:Choice xmlns:p14="http://schemas.microsoft.com/office/powerpoint/2010/main" Requires="p14">
+  <mc:AlternateContent xmlns:mc="http://schemas.openxmlformats.org/markup-compatibility/2006" xmlns:p14="http://schemas.microsoft.com/office/powerpoint/2010/main">
+    <mc:Choice Requires="p14">
       <p:transition spd="slow" p14:dur="2000"/>
     </mc:Choice>
-    <mc:Fallback>
+    <mc:Fallback xmlns="">
       <p:transition spd="slow"/>
     </mc:Fallback>
   </mc:AlternateContent>
@@ -19943,7 +20269,7 @@
 </p:sld>
 </file>
 
-<file path=ppt/slides/slide22.xml><?xml version="1.0" encoding="utf-8"?>
+<file path=ppt/slides/slide23.xml><?xml version="1.0" encoding="utf-8"?>
 <p:sld xmlns:a="http://schemas.openxmlformats.org/drawingml/2006/main" xmlns:r="http://schemas.openxmlformats.org/officeDocument/2006/relationships" xmlns:p="http://schemas.openxmlformats.org/presentationml/2006/main">
   <p:cSld>
     <p:spTree>
@@ -20359,7 +20685,7 @@
 </p:sld>
 </file>
 
-<file path=ppt/slides/slide23.xml><?xml version="1.0" encoding="utf-8"?>
+<file path=ppt/slides/slide24.xml><?xml version="1.0" encoding="utf-8"?>
 <p:sld xmlns:a="http://schemas.openxmlformats.org/drawingml/2006/main" xmlns:r="http://schemas.openxmlformats.org/officeDocument/2006/relationships" xmlns:p="http://schemas.openxmlformats.org/presentationml/2006/main">
   <p:cSld>
     <p:spTree>
@@ -21332,7 +21658,7 @@
 </p:sld>
 </file>
 
-<file path=ppt/slides/slide24.xml><?xml version="1.0" encoding="utf-8"?>
+<file path=ppt/slides/slide25.xml><?xml version="1.0" encoding="utf-8"?>
 <p:sld xmlns:a="http://schemas.openxmlformats.org/drawingml/2006/main" xmlns:r="http://schemas.openxmlformats.org/officeDocument/2006/relationships" xmlns:p="http://schemas.openxmlformats.org/presentationml/2006/main">
   <p:cSld>
     <p:spTree>
@@ -21962,7 +22288,7 @@
 </p:sld>
 </file>
 
-<file path=ppt/slides/slide25.xml><?xml version="1.0" encoding="utf-8"?>
+<file path=ppt/slides/slide26.xml><?xml version="1.0" encoding="utf-8"?>
 <p:sld xmlns:a="http://schemas.openxmlformats.org/drawingml/2006/main" xmlns:r="http://schemas.openxmlformats.org/officeDocument/2006/relationships" xmlns:p="http://schemas.openxmlformats.org/presentationml/2006/main">
   <p:cSld>
     <p:spTree>
@@ -22409,7 +22735,7 @@
 </p:sld>
 </file>
 
-<file path=ppt/slides/slide26.xml><?xml version="1.0" encoding="utf-8"?>
+<file path=ppt/slides/slide27.xml><?xml version="1.0" encoding="utf-8"?>
 <p:sld xmlns:a="http://schemas.openxmlformats.org/drawingml/2006/main" xmlns:r="http://schemas.openxmlformats.org/officeDocument/2006/relationships" xmlns:p="http://schemas.openxmlformats.org/presentationml/2006/main">
   <p:cSld>
     <p:spTree>
@@ -23467,11 +23793,11 @@
   <p:clrMapOvr>
     <a:masterClrMapping/>
   </p:clrMapOvr>
-  <mc:AlternateContent xmlns:mc="http://schemas.openxmlformats.org/markup-compatibility/2006">
-    <mc:Choice xmlns:p14="http://schemas.microsoft.com/office/powerpoint/2010/main" Requires="p14">
+  <mc:AlternateContent xmlns:mc="http://schemas.openxmlformats.org/markup-compatibility/2006" xmlns:p14="http://schemas.microsoft.com/office/powerpoint/2010/main">
+    <mc:Choice Requires="p14">
       <p:transition spd="slow" p14:dur="2000"/>
     </mc:Choice>
-    <mc:Fallback>
+    <mc:Fallback xmlns="">
       <p:transition spd="slow"/>
     </mc:Fallback>
   </mc:AlternateContent>
@@ -23485,7 +23811,7 @@
 </p:sld>
 </file>
 
-<file path=ppt/slides/slide27.xml><?xml version="1.0" encoding="utf-8"?>
+<file path=ppt/slides/slide28.xml><?xml version="1.0" encoding="utf-8"?>
 <p:sld xmlns:a="http://schemas.openxmlformats.org/drawingml/2006/main" xmlns:r="http://schemas.openxmlformats.org/officeDocument/2006/relationships" xmlns:p="http://schemas.openxmlformats.org/presentationml/2006/main">
   <p:cSld>
     <p:spTree>
@@ -23802,7 +24128,7 @@
 </p:sld>
 </file>
 
-<file path=ppt/slides/slide28.xml><?xml version="1.0" encoding="utf-8"?>
+<file path=ppt/slides/slide29.xml><?xml version="1.0" encoding="utf-8"?>
 <p:sld xmlns:a="http://schemas.openxmlformats.org/drawingml/2006/main" xmlns:r="http://schemas.openxmlformats.org/officeDocument/2006/relationships" xmlns:p="http://schemas.openxmlformats.org/presentationml/2006/main">
   <p:cSld>
     <p:spTree>
@@ -24265,16 +24591,12 @@
               <a:t>. </a:t>
             </a:r>
             <a:r>
-              <a:rPr lang="en-GB" dirty="0" err="1"/>
-              <a:t>nc</a:t>
-            </a:r>
-            <a:r>
-              <a:rPr lang="en-GB" sz="2400" dirty="0" err="1">
+              <a:rPr lang="en-GB" sz="2400" dirty="0" smtClean="0">
                 <a:solidFill>
                   <a:srgbClr val="000000"/>
                 </a:solidFill>
               </a:rPr>
-              <a:t>Reduce</a:t>
+              <a:t>Reduce </a:t>
             </a:r>
             <a:r>
               <a:rPr lang="en-GB" sz="2400" dirty="0">
@@ -24282,7 +24604,7 @@
                   <a:srgbClr val="000000"/>
                 </a:solidFill>
               </a:rPr>
-              <a:t> the number of files (i.e. years) processed each time:</a:t>
+              <a:t>the number of files (i.e. years) processed each time:</a:t>
             </a:r>
             <a:endParaRPr sz="2400" dirty="0"/>
           </a:p>
@@ -24653,7 +24975,367 @@
 </p:sld>
 </file>
 
-<file path=ppt/slides/slide29.xml><?xml version="1.0" encoding="utf-8"?>
+<file path=ppt/slides/slide3.xml><?xml version="1.0" encoding="utf-8"?>
+<p:sld xmlns:a="http://schemas.openxmlformats.org/drawingml/2006/main" xmlns:r="http://schemas.openxmlformats.org/officeDocument/2006/relationships" xmlns:p="http://schemas.openxmlformats.org/presentationml/2006/main">
+  <p:cSld>
+    <p:spTree>
+      <p:nvGrpSpPr>
+        <p:cNvPr id="1" name="Shape 129"/>
+        <p:cNvGrpSpPr/>
+        <p:nvPr/>
+      </p:nvGrpSpPr>
+      <p:grpSpPr>
+        <a:xfrm>
+          <a:off x="0" y="0"/>
+          <a:ext cx="0" cy="0"/>
+          <a:chOff x="0" y="0"/>
+          <a:chExt cx="0" cy="0"/>
+        </a:xfrm>
+      </p:grpSpPr>
+      <p:sp>
+        <p:nvSpPr>
+          <p:cNvPr id="130" name="Google Shape;130;p24"/>
+          <p:cNvSpPr txBox="1">
+            <a:spLocks noGrp="1"/>
+          </p:cNvSpPr>
+          <p:nvPr>
+            <p:ph type="title"/>
+          </p:nvPr>
+        </p:nvSpPr>
+        <p:spPr>
+          <a:xfrm>
+            <a:off x="457200" y="274638"/>
+            <a:ext cx="8229600" cy="562074"/>
+          </a:xfrm>
+          <a:prstGeom prst="rect">
+            <a:avLst/>
+          </a:prstGeom>
+          <a:noFill/>
+          <a:ln>
+            <a:noFill/>
+          </a:ln>
+        </p:spPr>
+        <p:txBody>
+          <a:bodyPr spcFirstLastPara="1" wrap="square" lIns="91425" tIns="45700" rIns="91425" bIns="45700" anchor="ctr" anchorCtr="0">
+            <a:noAutofit/>
+          </a:bodyPr>
+          <a:lstStyle/>
+          <a:p>
+            <a:pPr marL="0" lvl="0" indent="0" algn="ctr" rtl="0">
+              <a:lnSpc>
+                <a:spcPct val="90000"/>
+              </a:lnSpc>
+              <a:spcBef>
+                <a:spcPts val="0"/>
+              </a:spcBef>
+              <a:spcAft>
+                <a:spcPts val="0"/>
+              </a:spcAft>
+              <a:buClr>
+                <a:schemeClr val="dk1"/>
+              </a:buClr>
+              <a:buSzPts val="3200"/>
+              <a:buFont typeface="Nunito"/>
+              <a:buNone/>
+            </a:pPr>
+            <a:r>
+              <a:rPr lang="en-GB" sz="3200" b="1" dirty="0">
+                <a:latin typeface="Arial Rounded MT Bold" panose="020F0704030504030204" pitchFamily="34" charset="0"/>
+                <a:ea typeface="Nunito"/>
+                <a:cs typeface="Nunito"/>
+                <a:sym typeface="Nunito"/>
+              </a:rPr>
+              <a:t>Processing big data: the issues</a:t>
+            </a:r>
+            <a:endParaRPr dirty="0">
+              <a:latin typeface="Arial Rounded MT Bold" panose="020F0704030504030204" pitchFamily="34" charset="0"/>
+            </a:endParaRPr>
+          </a:p>
+        </p:txBody>
+      </p:sp>
+      <p:sp>
+        <p:nvSpPr>
+          <p:cNvPr id="131" name="Google Shape;131;p24"/>
+          <p:cNvSpPr txBox="1">
+            <a:spLocks noGrp="1"/>
+          </p:cNvSpPr>
+          <p:nvPr>
+            <p:ph type="body" idx="1"/>
+          </p:nvPr>
+        </p:nvSpPr>
+        <p:spPr>
+          <a:xfrm>
+            <a:off x="457200" y="980728"/>
+            <a:ext cx="8229600" cy="4824536"/>
+          </a:xfrm>
+          <a:prstGeom prst="rect">
+            <a:avLst/>
+          </a:prstGeom>
+          <a:noFill/>
+          <a:ln>
+            <a:noFill/>
+          </a:ln>
+        </p:spPr>
+        <p:txBody>
+          <a:bodyPr spcFirstLastPara="1" wrap="square" lIns="91425" tIns="45700" rIns="91425" bIns="45700" anchor="t" anchorCtr="0">
+            <a:noAutofit/>
+          </a:bodyPr>
+          <a:lstStyle/>
+          <a:p>
+            <a:pPr marL="228600" lvl="0" indent="-228600" algn="l" rtl="0">
+              <a:lnSpc>
+                <a:spcPct val="80000"/>
+              </a:lnSpc>
+              <a:spcBef>
+                <a:spcPts val="0"/>
+              </a:spcBef>
+              <a:spcAft>
+                <a:spcPts val="0"/>
+              </a:spcAft>
+              <a:buClr>
+                <a:srgbClr val="000000"/>
+              </a:buClr>
+              <a:buSzPts val="2800"/>
+              <a:buChar char="•"/>
+            </a:pPr>
+            <a:r>
+              <a:rPr lang="en-GB" sz="2800" dirty="0">
+                <a:solidFill>
+                  <a:srgbClr val="000000"/>
+                </a:solidFill>
+              </a:rPr>
+              <a:t>Parallel processing in the Environmental Sciences has historically focussed on running highly-parallelised models.</a:t>
+            </a:r>
+            <a:endParaRPr dirty="0"/>
+          </a:p>
+          <a:p>
+            <a:pPr marL="228600" lvl="0" indent="-228600" algn="l" rtl="0">
+              <a:lnSpc>
+                <a:spcPct val="80000"/>
+              </a:lnSpc>
+              <a:spcBef>
+                <a:spcPts val="1000"/>
+              </a:spcBef>
+              <a:spcAft>
+                <a:spcPts val="0"/>
+              </a:spcAft>
+              <a:buClr>
+                <a:srgbClr val="000000"/>
+              </a:buClr>
+              <a:buSzPts val="2800"/>
+              <a:buChar char="•"/>
+            </a:pPr>
+            <a:r>
+              <a:rPr lang="en-GB" sz="2800" dirty="0">
+                <a:solidFill>
+                  <a:srgbClr val="000000"/>
+                </a:solidFill>
+              </a:rPr>
+              <a:t>Data analysis was typically run sequentially because:</a:t>
+            </a:r>
+            <a:endParaRPr dirty="0"/>
+          </a:p>
+          <a:p>
+            <a:pPr marL="800100" lvl="1" algn="l" rtl="0">
+              <a:lnSpc>
+                <a:spcPct val="80000"/>
+              </a:lnSpc>
+              <a:spcBef>
+                <a:spcPts val="500"/>
+              </a:spcBef>
+              <a:spcAft>
+                <a:spcPts val="0"/>
+              </a:spcAft>
+              <a:buClr>
+                <a:srgbClr val="000000"/>
+              </a:buClr>
+              <a:buSzPts val="2400"/>
+              <a:buFont typeface="Calibri" panose="020F0502020204030204" pitchFamily="34" charset="0"/>
+              <a:buChar char="̶"/>
+            </a:pPr>
+            <a:r>
+              <a:rPr lang="en-GB" sz="2400" dirty="0">
+                <a:solidFill>
+                  <a:srgbClr val="000000"/>
+                </a:solidFill>
+              </a:rPr>
+              <a:t>It was a smaller problem</a:t>
+            </a:r>
+            <a:endParaRPr dirty="0"/>
+          </a:p>
+          <a:p>
+            <a:pPr marL="800100" lvl="1" algn="l" rtl="0">
+              <a:lnSpc>
+                <a:spcPct val="80000"/>
+              </a:lnSpc>
+              <a:spcBef>
+                <a:spcPts val="500"/>
+              </a:spcBef>
+              <a:spcAft>
+                <a:spcPts val="0"/>
+              </a:spcAft>
+              <a:buClr>
+                <a:srgbClr val="000000"/>
+              </a:buClr>
+              <a:buSzPts val="2400"/>
+              <a:buFont typeface="Calibri" panose="020F0502020204030204" pitchFamily="34" charset="0"/>
+              <a:buChar char="̶"/>
+            </a:pPr>
+            <a:r>
+              <a:rPr lang="en-GB" sz="2400" dirty="0">
+                <a:solidFill>
+                  <a:srgbClr val="000000"/>
+                </a:solidFill>
+              </a:rPr>
+              <a:t>It didn’t have parallel resources available</a:t>
+            </a:r>
+            <a:endParaRPr dirty="0"/>
+          </a:p>
+          <a:p>
+            <a:pPr marL="800100" lvl="1" algn="l" rtl="0">
+              <a:lnSpc>
+                <a:spcPct val="80000"/>
+              </a:lnSpc>
+              <a:spcBef>
+                <a:spcPts val="500"/>
+              </a:spcBef>
+              <a:spcAft>
+                <a:spcPts val="0"/>
+              </a:spcAft>
+              <a:buClr>
+                <a:srgbClr val="000000"/>
+              </a:buClr>
+              <a:buSzPts val="2400"/>
+              <a:buFont typeface="Calibri" panose="020F0502020204030204" pitchFamily="34" charset="0"/>
+              <a:buChar char="̶"/>
+            </a:pPr>
+            <a:r>
+              <a:rPr lang="en-GB" sz="2400" dirty="0">
+                <a:solidFill>
+                  <a:srgbClr val="000000"/>
+                </a:solidFill>
+              </a:rPr>
+              <a:t>The software/scientists were not equipped to work in parallel</a:t>
+            </a:r>
+            <a:endParaRPr dirty="0"/>
+          </a:p>
+          <a:p>
+            <a:pPr marL="228600" lvl="0" indent="-228600" algn="l" rtl="0">
+              <a:lnSpc>
+                <a:spcPct val="80000"/>
+              </a:lnSpc>
+              <a:spcBef>
+                <a:spcPts val="1000"/>
+              </a:spcBef>
+              <a:spcAft>
+                <a:spcPts val="0"/>
+              </a:spcAft>
+              <a:buClr>
+                <a:srgbClr val="000000"/>
+              </a:buClr>
+              <a:buSzPts val="2800"/>
+              <a:buChar char="•"/>
+            </a:pPr>
+            <a:r>
+              <a:rPr lang="en-GB" sz="2800" dirty="0">
+                <a:solidFill>
+                  <a:srgbClr val="000000"/>
+                </a:solidFill>
+              </a:rPr>
+              <a:t>The generation of enormous datasets (e.g. UPSCALE – around 300Tb) means that:</a:t>
+            </a:r>
+            <a:endParaRPr dirty="0"/>
+          </a:p>
+          <a:p>
+            <a:pPr marL="800100" lvl="1" algn="l" rtl="0">
+              <a:lnSpc>
+                <a:spcPct val="80000"/>
+              </a:lnSpc>
+              <a:spcBef>
+                <a:spcPts val="500"/>
+              </a:spcBef>
+              <a:spcAft>
+                <a:spcPts val="0"/>
+              </a:spcAft>
+              <a:buClr>
+                <a:srgbClr val="000000"/>
+              </a:buClr>
+              <a:buSzPts val="2400"/>
+              <a:buFont typeface="Calibri" panose="020F0502020204030204" pitchFamily="34" charset="0"/>
+              <a:buChar char="̶"/>
+            </a:pPr>
+            <a:r>
+              <a:rPr lang="en-GB" sz="2400" dirty="0">
+                <a:solidFill>
+                  <a:srgbClr val="000000"/>
+                </a:solidFill>
+              </a:rPr>
+              <a:t>Processing big data </a:t>
+            </a:r>
+            <a:r>
+              <a:rPr lang="en-GB" sz="2400" b="1" dirty="0">
+                <a:solidFill>
+                  <a:srgbClr val="000000"/>
+                </a:solidFill>
+              </a:rPr>
+              <a:t>requires</a:t>
+            </a:r>
+            <a:r>
+              <a:rPr lang="en-GB" sz="2400" dirty="0">
+                <a:solidFill>
+                  <a:srgbClr val="000000"/>
+                </a:solidFill>
+              </a:rPr>
+              <a:t> a parallel approach</a:t>
+            </a:r>
+            <a:endParaRPr dirty="0"/>
+          </a:p>
+          <a:p>
+            <a:pPr marL="800100" lvl="1" algn="l" rtl="0">
+              <a:lnSpc>
+                <a:spcPct val="80000"/>
+              </a:lnSpc>
+              <a:spcBef>
+                <a:spcPts val="500"/>
+              </a:spcBef>
+              <a:spcAft>
+                <a:spcPts val="0"/>
+              </a:spcAft>
+              <a:buClr>
+                <a:srgbClr val="000000"/>
+              </a:buClr>
+              <a:buSzPts val="2400"/>
+              <a:buFont typeface="Calibri" panose="020F0502020204030204" pitchFamily="34" charset="0"/>
+              <a:buChar char="̶"/>
+            </a:pPr>
+            <a:r>
+              <a:rPr lang="en-GB" sz="2400" dirty="0">
+                <a:solidFill>
+                  <a:srgbClr val="000000"/>
+                </a:solidFill>
+              </a:rPr>
+              <a:t>Fortunately, platforms, tools, and programmers are becoming better equipped</a:t>
+            </a:r>
+            <a:endParaRPr sz="2400" dirty="0"/>
+          </a:p>
+        </p:txBody>
+      </p:sp>
+    </p:spTree>
+  </p:cSld>
+  <p:clrMapOvr>
+    <a:masterClrMapping/>
+  </p:clrMapOvr>
+  <p:timing>
+    <p:tnLst>
+      <p:par>
+        <p:cTn id="1" dur="indefinite" restart="never" nodeType="tmRoot"/>
+      </p:par>
+    </p:tnLst>
+  </p:timing>
+</p:sld>
+</file>
+
+<file path=ppt/slides/slide30.xml><?xml version="1.0" encoding="utf-8"?>
 <p:sld xmlns:a="http://schemas.openxmlformats.org/drawingml/2006/main" xmlns:r="http://schemas.openxmlformats.org/officeDocument/2006/relationships" xmlns:p="http://schemas.openxmlformats.org/presentationml/2006/main">
   <p:cSld>
     <p:spTree>
@@ -25650,367 +26332,7 @@
 </p:sld>
 </file>
 
-<file path=ppt/slides/slide3.xml><?xml version="1.0" encoding="utf-8"?>
-<p:sld xmlns:a="http://schemas.openxmlformats.org/drawingml/2006/main" xmlns:r="http://schemas.openxmlformats.org/officeDocument/2006/relationships" xmlns:p="http://schemas.openxmlformats.org/presentationml/2006/main">
-  <p:cSld>
-    <p:spTree>
-      <p:nvGrpSpPr>
-        <p:cNvPr id="1" name="Shape 129"/>
-        <p:cNvGrpSpPr/>
-        <p:nvPr/>
-      </p:nvGrpSpPr>
-      <p:grpSpPr>
-        <a:xfrm>
-          <a:off x="0" y="0"/>
-          <a:ext cx="0" cy="0"/>
-          <a:chOff x="0" y="0"/>
-          <a:chExt cx="0" cy="0"/>
-        </a:xfrm>
-      </p:grpSpPr>
-      <p:sp>
-        <p:nvSpPr>
-          <p:cNvPr id="130" name="Google Shape;130;p24"/>
-          <p:cNvSpPr txBox="1">
-            <a:spLocks noGrp="1"/>
-          </p:cNvSpPr>
-          <p:nvPr>
-            <p:ph type="title"/>
-          </p:nvPr>
-        </p:nvSpPr>
-        <p:spPr>
-          <a:xfrm>
-            <a:off x="457200" y="274638"/>
-            <a:ext cx="8229600" cy="562074"/>
-          </a:xfrm>
-          <a:prstGeom prst="rect">
-            <a:avLst/>
-          </a:prstGeom>
-          <a:noFill/>
-          <a:ln>
-            <a:noFill/>
-          </a:ln>
-        </p:spPr>
-        <p:txBody>
-          <a:bodyPr spcFirstLastPara="1" wrap="square" lIns="91425" tIns="45700" rIns="91425" bIns="45700" anchor="ctr" anchorCtr="0">
-            <a:noAutofit/>
-          </a:bodyPr>
-          <a:lstStyle/>
-          <a:p>
-            <a:pPr marL="0" lvl="0" indent="0" algn="ctr" rtl="0">
-              <a:lnSpc>
-                <a:spcPct val="90000"/>
-              </a:lnSpc>
-              <a:spcBef>
-                <a:spcPts val="0"/>
-              </a:spcBef>
-              <a:spcAft>
-                <a:spcPts val="0"/>
-              </a:spcAft>
-              <a:buClr>
-                <a:schemeClr val="dk1"/>
-              </a:buClr>
-              <a:buSzPts val="3200"/>
-              <a:buFont typeface="Nunito"/>
-              <a:buNone/>
-            </a:pPr>
-            <a:r>
-              <a:rPr lang="en-GB" sz="3200" b="1" dirty="0">
-                <a:latin typeface="Arial Rounded MT Bold" panose="020F0704030504030204" pitchFamily="34" charset="0"/>
-                <a:ea typeface="Nunito"/>
-                <a:cs typeface="Nunito"/>
-                <a:sym typeface="Nunito"/>
-              </a:rPr>
-              <a:t>Processing big data: the issues</a:t>
-            </a:r>
-            <a:endParaRPr dirty="0">
-              <a:latin typeface="Arial Rounded MT Bold" panose="020F0704030504030204" pitchFamily="34" charset="0"/>
-            </a:endParaRPr>
-          </a:p>
-        </p:txBody>
-      </p:sp>
-      <p:sp>
-        <p:nvSpPr>
-          <p:cNvPr id="131" name="Google Shape;131;p24"/>
-          <p:cNvSpPr txBox="1">
-            <a:spLocks noGrp="1"/>
-          </p:cNvSpPr>
-          <p:nvPr>
-            <p:ph type="body" idx="1"/>
-          </p:nvPr>
-        </p:nvSpPr>
-        <p:spPr>
-          <a:xfrm>
-            <a:off x="457200" y="980728"/>
-            <a:ext cx="8229600" cy="4824536"/>
-          </a:xfrm>
-          <a:prstGeom prst="rect">
-            <a:avLst/>
-          </a:prstGeom>
-          <a:noFill/>
-          <a:ln>
-            <a:noFill/>
-          </a:ln>
-        </p:spPr>
-        <p:txBody>
-          <a:bodyPr spcFirstLastPara="1" wrap="square" lIns="91425" tIns="45700" rIns="91425" bIns="45700" anchor="t" anchorCtr="0">
-            <a:noAutofit/>
-          </a:bodyPr>
-          <a:lstStyle/>
-          <a:p>
-            <a:pPr marL="228600" lvl="0" indent="-228600" algn="l" rtl="0">
-              <a:lnSpc>
-                <a:spcPct val="80000"/>
-              </a:lnSpc>
-              <a:spcBef>
-                <a:spcPts val="0"/>
-              </a:spcBef>
-              <a:spcAft>
-                <a:spcPts val="0"/>
-              </a:spcAft>
-              <a:buClr>
-                <a:srgbClr val="000000"/>
-              </a:buClr>
-              <a:buSzPts val="2800"/>
-              <a:buChar char="•"/>
-            </a:pPr>
-            <a:r>
-              <a:rPr lang="en-GB" sz="2800" dirty="0">
-                <a:solidFill>
-                  <a:srgbClr val="000000"/>
-                </a:solidFill>
-              </a:rPr>
-              <a:t>Parallel processing in the Environmental Sciences has historically focussed on running highly-parallelised models.</a:t>
-            </a:r>
-            <a:endParaRPr dirty="0"/>
-          </a:p>
-          <a:p>
-            <a:pPr marL="228600" lvl="0" indent="-228600" algn="l" rtl="0">
-              <a:lnSpc>
-                <a:spcPct val="80000"/>
-              </a:lnSpc>
-              <a:spcBef>
-                <a:spcPts val="1000"/>
-              </a:spcBef>
-              <a:spcAft>
-                <a:spcPts val="0"/>
-              </a:spcAft>
-              <a:buClr>
-                <a:srgbClr val="000000"/>
-              </a:buClr>
-              <a:buSzPts val="2800"/>
-              <a:buChar char="•"/>
-            </a:pPr>
-            <a:r>
-              <a:rPr lang="en-GB" sz="2800" dirty="0">
-                <a:solidFill>
-                  <a:srgbClr val="000000"/>
-                </a:solidFill>
-              </a:rPr>
-              <a:t>Data analysis was typically run sequentially because:</a:t>
-            </a:r>
-            <a:endParaRPr dirty="0"/>
-          </a:p>
-          <a:p>
-            <a:pPr marL="800100" lvl="1" algn="l" rtl="0">
-              <a:lnSpc>
-                <a:spcPct val="80000"/>
-              </a:lnSpc>
-              <a:spcBef>
-                <a:spcPts val="500"/>
-              </a:spcBef>
-              <a:spcAft>
-                <a:spcPts val="0"/>
-              </a:spcAft>
-              <a:buClr>
-                <a:srgbClr val="000000"/>
-              </a:buClr>
-              <a:buSzPts val="2400"/>
-              <a:buFont typeface="Calibri" panose="020F0502020204030204" pitchFamily="34" charset="0"/>
-              <a:buChar char="̶"/>
-            </a:pPr>
-            <a:r>
-              <a:rPr lang="en-GB" sz="2400" dirty="0">
-                <a:solidFill>
-                  <a:srgbClr val="000000"/>
-                </a:solidFill>
-              </a:rPr>
-              <a:t>It was a smaller problem</a:t>
-            </a:r>
-            <a:endParaRPr dirty="0"/>
-          </a:p>
-          <a:p>
-            <a:pPr marL="800100" lvl="1" algn="l" rtl="0">
-              <a:lnSpc>
-                <a:spcPct val="80000"/>
-              </a:lnSpc>
-              <a:spcBef>
-                <a:spcPts val="500"/>
-              </a:spcBef>
-              <a:spcAft>
-                <a:spcPts val="0"/>
-              </a:spcAft>
-              <a:buClr>
-                <a:srgbClr val="000000"/>
-              </a:buClr>
-              <a:buSzPts val="2400"/>
-              <a:buFont typeface="Calibri" panose="020F0502020204030204" pitchFamily="34" charset="0"/>
-              <a:buChar char="̶"/>
-            </a:pPr>
-            <a:r>
-              <a:rPr lang="en-GB" sz="2400" dirty="0">
-                <a:solidFill>
-                  <a:srgbClr val="000000"/>
-                </a:solidFill>
-              </a:rPr>
-              <a:t>It didn’t have parallel resources available</a:t>
-            </a:r>
-            <a:endParaRPr dirty="0"/>
-          </a:p>
-          <a:p>
-            <a:pPr marL="800100" lvl="1" algn="l" rtl="0">
-              <a:lnSpc>
-                <a:spcPct val="80000"/>
-              </a:lnSpc>
-              <a:spcBef>
-                <a:spcPts val="500"/>
-              </a:spcBef>
-              <a:spcAft>
-                <a:spcPts val="0"/>
-              </a:spcAft>
-              <a:buClr>
-                <a:srgbClr val="000000"/>
-              </a:buClr>
-              <a:buSzPts val="2400"/>
-              <a:buFont typeface="Calibri" panose="020F0502020204030204" pitchFamily="34" charset="0"/>
-              <a:buChar char="̶"/>
-            </a:pPr>
-            <a:r>
-              <a:rPr lang="en-GB" sz="2400" dirty="0">
-                <a:solidFill>
-                  <a:srgbClr val="000000"/>
-                </a:solidFill>
-              </a:rPr>
-              <a:t>The software/scientists were not equipped to work in parallel</a:t>
-            </a:r>
-            <a:endParaRPr dirty="0"/>
-          </a:p>
-          <a:p>
-            <a:pPr marL="228600" lvl="0" indent="-228600" algn="l" rtl="0">
-              <a:lnSpc>
-                <a:spcPct val="80000"/>
-              </a:lnSpc>
-              <a:spcBef>
-                <a:spcPts val="1000"/>
-              </a:spcBef>
-              <a:spcAft>
-                <a:spcPts val="0"/>
-              </a:spcAft>
-              <a:buClr>
-                <a:srgbClr val="000000"/>
-              </a:buClr>
-              <a:buSzPts val="2800"/>
-              <a:buChar char="•"/>
-            </a:pPr>
-            <a:r>
-              <a:rPr lang="en-GB" sz="2800" dirty="0">
-                <a:solidFill>
-                  <a:srgbClr val="000000"/>
-                </a:solidFill>
-              </a:rPr>
-              <a:t>The generation of enormous datasets (e.g. UPSCALE – around 300Tb) means that:</a:t>
-            </a:r>
-            <a:endParaRPr dirty="0"/>
-          </a:p>
-          <a:p>
-            <a:pPr marL="800100" lvl="1" algn="l" rtl="0">
-              <a:lnSpc>
-                <a:spcPct val="80000"/>
-              </a:lnSpc>
-              <a:spcBef>
-                <a:spcPts val="500"/>
-              </a:spcBef>
-              <a:spcAft>
-                <a:spcPts val="0"/>
-              </a:spcAft>
-              <a:buClr>
-                <a:srgbClr val="000000"/>
-              </a:buClr>
-              <a:buSzPts val="2400"/>
-              <a:buFont typeface="Calibri" panose="020F0502020204030204" pitchFamily="34" charset="0"/>
-              <a:buChar char="̶"/>
-            </a:pPr>
-            <a:r>
-              <a:rPr lang="en-GB" sz="2400" dirty="0">
-                <a:solidFill>
-                  <a:srgbClr val="000000"/>
-                </a:solidFill>
-              </a:rPr>
-              <a:t>Processing big data </a:t>
-            </a:r>
-            <a:r>
-              <a:rPr lang="en-GB" sz="2400" b="1" dirty="0">
-                <a:solidFill>
-                  <a:srgbClr val="000000"/>
-                </a:solidFill>
-              </a:rPr>
-              <a:t>requires</a:t>
-            </a:r>
-            <a:r>
-              <a:rPr lang="en-GB" sz="2400" dirty="0">
-                <a:solidFill>
-                  <a:srgbClr val="000000"/>
-                </a:solidFill>
-              </a:rPr>
-              <a:t> a parallel approach</a:t>
-            </a:r>
-            <a:endParaRPr dirty="0"/>
-          </a:p>
-          <a:p>
-            <a:pPr marL="800100" lvl="1" algn="l" rtl="0">
-              <a:lnSpc>
-                <a:spcPct val="80000"/>
-              </a:lnSpc>
-              <a:spcBef>
-                <a:spcPts val="500"/>
-              </a:spcBef>
-              <a:spcAft>
-                <a:spcPts val="0"/>
-              </a:spcAft>
-              <a:buClr>
-                <a:srgbClr val="000000"/>
-              </a:buClr>
-              <a:buSzPts val="2400"/>
-              <a:buFont typeface="Calibri" panose="020F0502020204030204" pitchFamily="34" charset="0"/>
-              <a:buChar char="̶"/>
-            </a:pPr>
-            <a:r>
-              <a:rPr lang="en-GB" sz="2400" dirty="0">
-                <a:solidFill>
-                  <a:srgbClr val="000000"/>
-                </a:solidFill>
-              </a:rPr>
-              <a:t>Fortunately, platforms, tools, and programmers are becoming better equipped</a:t>
-            </a:r>
-            <a:endParaRPr sz="2400" dirty="0"/>
-          </a:p>
-        </p:txBody>
-      </p:sp>
-    </p:spTree>
-  </p:cSld>
-  <p:clrMapOvr>
-    <a:masterClrMapping/>
-  </p:clrMapOvr>
-  <p:timing>
-    <p:tnLst>
-      <p:par>
-        <p:cTn id="1" dur="indefinite" restart="never" nodeType="tmRoot"/>
-      </p:par>
-    </p:tnLst>
-  </p:timing>
-</p:sld>
-</file>
-
-<file path=ppt/slides/slide30.xml><?xml version="1.0" encoding="utf-8"?>
+<file path=ppt/slides/slide31.xml><?xml version="1.0" encoding="utf-8"?>
 <p:sld xmlns:a="http://schemas.openxmlformats.org/drawingml/2006/main" xmlns:r="http://schemas.openxmlformats.org/officeDocument/2006/relationships" xmlns:p="http://schemas.openxmlformats.org/presentationml/2006/main">
   <p:cSld>
     <p:spTree>
@@ -26608,7 +26930,7 @@
 </p:sld>
 </file>
 
-<file path=ppt/slides/slide31.xml><?xml version="1.0" encoding="utf-8"?>
+<file path=ppt/slides/slide32.xml><?xml version="1.0" encoding="utf-8"?>
 <p:sld xmlns:a="http://schemas.openxmlformats.org/drawingml/2006/main" xmlns:r="http://schemas.openxmlformats.org/officeDocument/2006/relationships" xmlns:p="http://schemas.openxmlformats.org/presentationml/2006/main">
   <p:cSld>
     <p:spTree>
@@ -26888,7 +27210,7 @@
 </p:sld>
 </file>
 
-<file path=ppt/slides/slide32.xml><?xml version="1.0" encoding="utf-8"?>
+<file path=ppt/slides/slide33.xml><?xml version="1.0" encoding="utf-8"?>
 <p:sld xmlns:a="http://schemas.openxmlformats.org/drawingml/2006/main" xmlns:r="http://schemas.openxmlformats.org/officeDocument/2006/relationships" xmlns:p="http://schemas.openxmlformats.org/presentationml/2006/main">
   <p:cSld>
     <p:spTree>

</xml_diff>